<commit_message>
Handle client reconnection with Polly.
</commit_message>
<xml_diff>
--- a/Presentation/Microsoft Orleans.pptx
+++ b/Presentation/Microsoft Orleans.pptx
@@ -19,6 +19,7 @@
     <p:sldId id="269" r:id="rId16"/>
     <p:sldId id="270" r:id="rId17"/>
     <p:sldId id="271" r:id="rId18"/>
+    <p:sldId id="272" r:id="rId19"/>
   </p:sldIdLst>
   <p:sldSz cx="12192000" cy="6858000"/>
   <p:notesSz cx="6858000" cy="9144000"/>
@@ -5233,6 +5234,219 @@
 </p:sld>
 </file>
 
+<file path=ppt/slides/slide15.xml><?xml version="1.0" encoding="utf-8"?>
+<p:sld xmlns:a="http://schemas.openxmlformats.org/drawingml/2006/main" xmlns:r="http://schemas.openxmlformats.org/officeDocument/2006/relationships" xmlns:p="http://schemas.openxmlformats.org/presentationml/2006/main">
+  <p:cSld>
+    <p:spTree>
+      <p:nvGrpSpPr>
+        <p:cNvPr id="1" name=""/>
+        <p:cNvGrpSpPr/>
+        <p:nvPr/>
+      </p:nvGrpSpPr>
+      <p:grpSpPr>
+        <a:xfrm>
+          <a:off x="0" y="0"/>
+          <a:ext cx="0" cy="0"/>
+          <a:chOff x="0" y="0"/>
+          <a:chExt cx="0" cy="0"/>
+        </a:xfrm>
+      </p:grpSpPr>
+      <p:sp>
+        <p:nvSpPr>
+          <p:cNvPr id="2" name="Title 1">
+            <a:extLst>
+              <a:ext uri="{FF2B5EF4-FFF2-40B4-BE49-F238E27FC236}">
+                <a16:creationId xmlns:a16="http://schemas.microsoft.com/office/drawing/2014/main" id="{83EDC1EC-65DF-4E14-A395-D4D7339278AF}"/>
+              </a:ext>
+            </a:extLst>
+          </p:cNvPr>
+          <p:cNvSpPr>
+            <a:spLocks noGrp="1"/>
+          </p:cNvSpPr>
+          <p:nvPr>
+            <p:ph type="title"/>
+          </p:nvPr>
+        </p:nvSpPr>
+        <p:spPr>
+          <a:xfrm>
+            <a:off x="581192" y="702156"/>
+            <a:ext cx="11029616" cy="455525"/>
+          </a:xfrm>
+        </p:spPr>
+        <p:txBody>
+          <a:bodyPr>
+            <a:normAutofit fontScale="90000"/>
+          </a:bodyPr>
+          <a:lstStyle/>
+          <a:p>
+            <a:r>
+              <a:rPr lang="en-US" dirty="0"/>
+              <a:t>Polly</a:t>
+            </a:r>
+          </a:p>
+        </p:txBody>
+      </p:sp>
+      <p:sp>
+        <p:nvSpPr>
+          <p:cNvPr id="4" name="TextBox 3">
+            <a:extLst>
+              <a:ext uri="{FF2B5EF4-FFF2-40B4-BE49-F238E27FC236}">
+                <a16:creationId xmlns:a16="http://schemas.microsoft.com/office/drawing/2014/main" id="{2D6BC654-D157-486F-A2AB-C45F50D5E1C3}"/>
+              </a:ext>
+            </a:extLst>
+          </p:cNvPr>
+          <p:cNvSpPr txBox="1"/>
+          <p:nvPr/>
+        </p:nvSpPr>
+        <p:spPr>
+          <a:xfrm>
+            <a:off x="100667" y="1157681"/>
+            <a:ext cx="7048276" cy="2308324"/>
+          </a:xfrm>
+          <a:prstGeom prst="rect">
+            <a:avLst/>
+          </a:prstGeom>
+          <a:noFill/>
+        </p:spPr>
+        <p:txBody>
+          <a:bodyPr wrap="none" rtlCol="0">
+            <a:spAutoFit/>
+          </a:bodyPr>
+          <a:lstStyle/>
+          <a:p>
+            <a:pPr marL="285750" indent="-285750">
+              <a:buFont typeface="Arial" panose="020B0604020202020204" pitchFamily="34" charset="0"/>
+              <a:buChar char="•"/>
+            </a:pPr>
+            <a:r>
+              <a:rPr lang="en-US" dirty="0"/>
+              <a:t>Polly is a resilient library which allows us to express policies such as</a:t>
+            </a:r>
+          </a:p>
+          <a:p>
+            <a:pPr marL="742950" lvl="1" indent="-285750">
+              <a:buFont typeface="Arial" panose="020B0604020202020204" pitchFamily="34" charset="0"/>
+              <a:buChar char="•"/>
+            </a:pPr>
+            <a:r>
+              <a:rPr lang="en-US" dirty="0"/>
+              <a:t>     Retry</a:t>
+            </a:r>
+          </a:p>
+          <a:p>
+            <a:pPr marL="742950" lvl="1" indent="-285750">
+              <a:buFont typeface="Arial" panose="020B0604020202020204" pitchFamily="34" charset="0"/>
+              <a:buChar char="•"/>
+            </a:pPr>
+            <a:r>
+              <a:rPr lang="en-US" dirty="0"/>
+              <a:t>     Circuit Breaker</a:t>
+            </a:r>
+          </a:p>
+          <a:p>
+            <a:pPr marL="742950" lvl="1" indent="-285750">
+              <a:buFont typeface="Arial" panose="020B0604020202020204" pitchFamily="34" charset="0"/>
+              <a:buChar char="•"/>
+            </a:pPr>
+            <a:r>
+              <a:rPr lang="en-US" dirty="0"/>
+              <a:t>     Timeout</a:t>
+            </a:r>
+          </a:p>
+          <a:p>
+            <a:pPr marL="742950" lvl="1" indent="-285750">
+              <a:buFont typeface="Arial" panose="020B0604020202020204" pitchFamily="34" charset="0"/>
+              <a:buChar char="•"/>
+            </a:pPr>
+            <a:r>
+              <a:rPr lang="en-US" dirty="0"/>
+              <a:t>     Cache</a:t>
+            </a:r>
+          </a:p>
+          <a:p>
+            <a:pPr marL="742950" lvl="1" indent="-285750">
+              <a:buFont typeface="Arial" panose="020B0604020202020204" pitchFamily="34" charset="0"/>
+              <a:buChar char="•"/>
+            </a:pPr>
+            <a:r>
+              <a:rPr lang="en-US" dirty="0"/>
+              <a:t>     Fallback</a:t>
+            </a:r>
+          </a:p>
+          <a:p>
+            <a:pPr marL="742950" lvl="1" indent="-285750">
+              <a:buFont typeface="Arial" panose="020B0604020202020204" pitchFamily="34" charset="0"/>
+              <a:buChar char="•"/>
+            </a:pPr>
+            <a:r>
+              <a:rPr lang="en-US" dirty="0"/>
+              <a:t>     … (Tons of others)</a:t>
+            </a:r>
+          </a:p>
+          <a:p>
+            <a:endParaRPr lang="en-US" dirty="0"/>
+          </a:p>
+        </p:txBody>
+      </p:sp>
+      <p:sp>
+        <p:nvSpPr>
+          <p:cNvPr id="5" name="TextBox 4">
+            <a:extLst>
+              <a:ext uri="{FF2B5EF4-FFF2-40B4-BE49-F238E27FC236}">
+                <a16:creationId xmlns:a16="http://schemas.microsoft.com/office/drawing/2014/main" id="{1985FDD5-70EA-4404-8A8F-D9211EAE185C}"/>
+              </a:ext>
+            </a:extLst>
+          </p:cNvPr>
+          <p:cNvSpPr txBox="1"/>
+          <p:nvPr/>
+        </p:nvSpPr>
+        <p:spPr>
+          <a:xfrm>
+            <a:off x="192947" y="3466005"/>
+            <a:ext cx="9726509" cy="646331"/>
+          </a:xfrm>
+          <a:prstGeom prst="rect">
+            <a:avLst/>
+          </a:prstGeom>
+          <a:noFill/>
+        </p:spPr>
+        <p:txBody>
+          <a:bodyPr wrap="none" rtlCol="0">
+            <a:spAutoFit/>
+          </a:bodyPr>
+          <a:lstStyle/>
+          <a:p>
+            <a:r>
+              <a:rPr lang="en-US" dirty="0"/>
+              <a:t>Client sometimes try to connect to Silo and Silo is unavailable (Still loading or whatever).</a:t>
+            </a:r>
+          </a:p>
+          <a:p>
+            <a:r>
+              <a:rPr lang="en-US" dirty="0"/>
+              <a:t>Silo is throwing exceptions like Silo unavailable exception and others. We can </a:t>
+            </a:r>
+            <a:r>
+              <a:rPr lang="en-US"/>
+              <a:t>give client more tries.</a:t>
+            </a:r>
+            <a:endParaRPr lang="en-US" dirty="0"/>
+          </a:p>
+        </p:txBody>
+      </p:sp>
+    </p:spTree>
+    <p:extLst>
+      <p:ext uri="{BB962C8B-B14F-4D97-AF65-F5344CB8AC3E}">
+        <p14:creationId xmlns:p14="http://schemas.microsoft.com/office/powerpoint/2010/main" val="2089910653"/>
+      </p:ext>
+    </p:extLst>
+  </p:cSld>
+  <p:clrMapOvr>
+    <a:masterClrMapping/>
+  </p:clrMapOvr>
+</p:sld>
+</file>
+
 <file path=ppt/slides/slide2.xml><?xml version="1.0" encoding="utf-8"?>
 <p:sld xmlns:a="http://schemas.openxmlformats.org/drawingml/2006/main" xmlns:r="http://schemas.openxmlformats.org/officeDocument/2006/relationships" xmlns:p="http://schemas.openxmlformats.org/presentationml/2006/main">
   <p:cSld>
@@ -6866,6 +7080,24 @@
 </file>
 
 <file path=customXml/item1.xml><?xml version="1.0" encoding="utf-8"?>
+<p:properties xmlns:p="http://schemas.microsoft.com/office/2006/metadata/properties" xmlns:xsi="http://www.w3.org/2001/XMLSchema-instance" xmlns:pc="http://schemas.microsoft.com/office/infopath/2007/PartnerControls">
+  <documentManagement>
+    <Status xmlns="71af3243-3dd4-4a8d-8c0d-dd76da1f02a5">Not started</Status>
+    <MediaServiceKeyPoints xmlns="71af3243-3dd4-4a8d-8c0d-dd76da1f02a5" xsi:nil="true"/>
+  </documentManagement>
+</p:properties>
+</file>
+
+<file path=customXml/item2.xml><?xml version="1.0" encoding="utf-8"?>
+<?mso-contentType ?>
+<FormTemplates xmlns="http://schemas.microsoft.com/sharepoint/v3/contenttype/forms">
+  <Display>DocumentLibraryForm</Display>
+  <Edit>DocumentLibraryForm</Edit>
+  <New>DocumentLibraryForm</New>
+</FormTemplates>
+</file>
+
+<file path=customXml/item3.xml><?xml version="1.0" encoding="utf-8"?>
 <ct:contentTypeSchema xmlns:ct="http://schemas.microsoft.com/office/2006/metadata/contentType" xmlns:ma="http://schemas.microsoft.com/office/2006/metadata/properties/metaAttributes" ct:_="" ma:_="" ma:contentTypeName="Document" ma:contentTypeID="0x01010079F111ED35F8CC479449609E8A0923A6" ma:contentTypeVersion="12" ma:contentTypeDescription="Create a new document." ma:contentTypeScope="" ma:versionID="a410dd7f93c95333ffa1b60ed6adedd1">
   <xsd:schema xmlns:xsd="http://www.w3.org/2001/XMLSchema" xmlns:xs="http://www.w3.org/2001/XMLSchema" xmlns:p="http://schemas.microsoft.com/office/2006/metadata/properties" xmlns:ns2="71af3243-3dd4-4a8d-8c0d-dd76da1f02a5" xmlns:ns3="16c05727-aa75-4e4a-9b5f-8a80a1165891" targetNamespace="http://schemas.microsoft.com/office/2006/metadata/properties" ma:root="true" ma:fieldsID="a936d9baba76aa3866493feff160faab" ns2:_="" ns3:_="">
     <xsd:import namespace="71af3243-3dd4-4a8d-8c0d-dd76da1f02a5"/>
@@ -7086,25 +7318,25 @@
 </ct:contentTypeSchema>
 </file>
 
-<file path=customXml/item2.xml><?xml version="1.0" encoding="utf-8"?>
-<?mso-contentType ?>
-<FormTemplates xmlns="http://schemas.microsoft.com/sharepoint/v3/contenttype/forms">
-  <Display>DocumentLibraryForm</Display>
-  <Edit>DocumentLibraryForm</Edit>
-  <New>DocumentLibraryForm</New>
-</FormTemplates>
+<file path=customXml/itemProps1.xml><?xml version="1.0" encoding="utf-8"?>
+<ds:datastoreItem xmlns:ds="http://schemas.openxmlformats.org/officeDocument/2006/customXml" ds:itemID="{8D289AE2-D2AE-49D1-AFAC-3A79F6794255}">
+  <ds:schemaRefs>
+    <ds:schemaRef ds:uri="http://schemas.microsoft.com/office/2006/metadata/properties"/>
+    <ds:schemaRef ds:uri="http://schemas.microsoft.com/office/infopath/2007/PartnerControls"/>
+    <ds:schemaRef ds:uri="71af3243-3dd4-4a8d-8c0d-dd76da1f02a5"/>
+  </ds:schemaRefs>
+</ds:datastoreItem>
 </file>
 
-<file path=customXml/item3.xml><?xml version="1.0" encoding="utf-8"?>
-<p:properties xmlns:p="http://schemas.microsoft.com/office/2006/metadata/properties" xmlns:xsi="http://www.w3.org/2001/XMLSchema-instance" xmlns:pc="http://schemas.microsoft.com/office/infopath/2007/PartnerControls">
-  <documentManagement>
-    <Status xmlns="71af3243-3dd4-4a8d-8c0d-dd76da1f02a5">Not started</Status>
-    <MediaServiceKeyPoints xmlns="71af3243-3dd4-4a8d-8c0d-dd76da1f02a5" xsi:nil="true"/>
-  </documentManagement>
-</p:properties>
+<file path=customXml/itemProps2.xml><?xml version="1.0" encoding="utf-8"?>
+<ds:datastoreItem xmlns:ds="http://schemas.openxmlformats.org/officeDocument/2006/customXml" ds:itemID="{927BD4C1-B6B1-4715-ABF9-E660A51A4EA0}">
+  <ds:schemaRefs>
+    <ds:schemaRef ds:uri="http://schemas.microsoft.com/sharepoint/v3/contenttype/forms"/>
+  </ds:schemaRefs>
+</ds:datastoreItem>
 </file>
 
-<file path=customXml/itemProps1.xml><?xml version="1.0" encoding="utf-8"?>
+<file path=customXml/itemProps3.xml><?xml version="1.0" encoding="utf-8"?>
 <ds:datastoreItem xmlns:ds="http://schemas.openxmlformats.org/officeDocument/2006/customXml" ds:itemID="{41E7CA09-9778-4414-AE97-8064B12DA30E}">
   <ds:schemaRefs>
     <ds:schemaRef ds:uri="http://schemas.microsoft.com/office/2006/metadata/contentType"/>
@@ -7121,22 +7353,4 @@
     <ds:schemaRef ds:uri="http://schemas.microsoft.com/internal/obd"/>
   </ds:schemaRefs>
 </ds:datastoreItem>
-</file>
-
-<file path=customXml/itemProps2.xml><?xml version="1.0" encoding="utf-8"?>
-<ds:datastoreItem xmlns:ds="http://schemas.openxmlformats.org/officeDocument/2006/customXml" ds:itemID="{927BD4C1-B6B1-4715-ABF9-E660A51A4EA0}">
-  <ds:schemaRefs>
-    <ds:schemaRef ds:uri="http://schemas.microsoft.com/sharepoint/v3/contenttype/forms"/>
-  </ds:schemaRefs>
-</ds:datastoreItem>
-</file>
-
-<file path=customXml/itemProps3.xml><?xml version="1.0" encoding="utf-8"?>
-<ds:datastoreItem xmlns:ds="http://schemas.openxmlformats.org/officeDocument/2006/customXml" ds:itemID="{8D289AE2-D2AE-49D1-AFAC-3A79F6794255}">
-  <ds:schemaRefs>
-    <ds:schemaRef ds:uri="http://schemas.microsoft.com/office/2006/metadata/properties"/>
-    <ds:schemaRef ds:uri="http://schemas.microsoft.com/office/infopath/2007/PartnerControls"/>
-    <ds:schemaRef ds:uri="71af3243-3dd4-4a8d-8c0d-dd76da1f02a5"/>
-  </ds:schemaRefs>
-</ds:datastoreItem>
 </file>
</xml_diff>

<commit_message>
Grain persistence with ADO.Net.
</commit_message>
<xml_diff>
--- a/Presentation/Microsoft Orleans.pptx
+++ b/Presentation/Microsoft Orleans.pptx
@@ -20,6 +20,12 @@
     <p:sldId id="270" r:id="rId17"/>
     <p:sldId id="271" r:id="rId18"/>
     <p:sldId id="272" r:id="rId19"/>
+    <p:sldId id="273" r:id="rId20"/>
+    <p:sldId id="274" r:id="rId21"/>
+    <p:sldId id="275" r:id="rId22"/>
+    <p:sldId id="276" r:id="rId23"/>
+    <p:sldId id="277" r:id="rId24"/>
+    <p:sldId id="278" r:id="rId25"/>
   </p:sldIdLst>
   <p:sldSz cx="12192000" cy="6858000"/>
   <p:notesSz cx="6858000" cy="9144000"/>
@@ -364,7 +370,7 @@
           <a:p>
             <a:fld id="{ED291B17-9318-49DB-B28B-6E5994AE9581}" type="datetime1">
               <a:rPr lang="en-US" smtClean="0"/>
-              <a:t>1/13/2021</a:t>
+              <a:t>1/15/2021</a:t>
             </a:fld>
             <a:endParaRPr lang="en-US" dirty="0"/>
           </a:p>
@@ -567,7 +573,7 @@
           <a:p>
             <a:fld id="{2CED4963-E985-44C4-B8C4-FDD613B7C2F8}" type="datetime1">
               <a:rPr lang="en-US" smtClean="0"/>
-              <a:t>1/13/2021</a:t>
+              <a:t>1/15/2021</a:t>
             </a:fld>
             <a:endParaRPr lang="en-US" dirty="0"/>
           </a:p>
@@ -929,7 +935,7 @@
           <a:p>
             <a:fld id="{ED291B17-9318-49DB-B28B-6E5994AE9581}" type="datetime1">
               <a:rPr lang="en-US" smtClean="0"/>
-              <a:t>1/13/2021</a:t>
+              <a:t>1/15/2021</a:t>
             </a:fld>
             <a:endParaRPr lang="en-US" dirty="0"/>
           </a:p>
@@ -1127,7 +1133,7 @@
           <a:p>
             <a:fld id="{78DD82B9-B8EE-4375-B6FF-88FA6ABB15D9}" type="datetime1">
               <a:rPr lang="en-US" smtClean="0"/>
-              <a:t>1/13/2021</a:t>
+              <a:t>1/15/2021</a:t>
             </a:fld>
             <a:endParaRPr lang="en-US" dirty="0"/>
           </a:p>
@@ -1439,7 +1445,7 @@
           <a:p>
             <a:fld id="{B2497495-0637-405E-AE64-5CC7506D51F5}" type="datetime1">
               <a:rPr lang="en-US" smtClean="0"/>
-              <a:t>1/13/2021</a:t>
+              <a:t>1/15/2021</a:t>
             </a:fld>
             <a:endParaRPr lang="en-US" dirty="0"/>
           </a:p>
@@ -1692,7 +1698,7 @@
           <a:p>
             <a:fld id="{7BFFD690-9426-415D-8B65-26881E07B2D4}" type="datetime1">
               <a:rPr lang="en-US" smtClean="0"/>
-              <a:t>1/13/2021</a:t>
+              <a:t>1/15/2021</a:t>
             </a:fld>
             <a:endParaRPr lang="en-US" dirty="0"/>
           </a:p>
@@ -2114,7 +2120,7 @@
           <a:p>
             <a:fld id="{04C4989A-474C-40DE-95B9-011C28B71673}" type="datetime1">
               <a:rPr lang="en-US" smtClean="0"/>
-              <a:t>1/13/2021</a:t>
+              <a:t>1/15/2021</a:t>
             </a:fld>
             <a:endParaRPr lang="en-US" dirty="0"/>
           </a:p>
@@ -2237,7 +2243,7 @@
           <a:p>
             <a:fld id="{5DB4ED54-5B5E-4A04-93D3-5772E3CE3818}" type="datetime1">
               <a:rPr lang="en-US" smtClean="0"/>
-              <a:t>1/13/2021</a:t>
+              <a:t>1/15/2021</a:t>
             </a:fld>
             <a:endParaRPr lang="en-US" dirty="0"/>
           </a:p>
@@ -2332,7 +2338,7 @@
           <a:p>
             <a:fld id="{4EDE50D6-574B-40AF-946F-D52A04ADE379}" type="datetime1">
               <a:rPr lang="en-US" smtClean="0"/>
-              <a:t>1/13/2021</a:t>
+              <a:t>1/15/2021</a:t>
             </a:fld>
             <a:endParaRPr lang="en-US" dirty="0"/>
           </a:p>
@@ -2709,7 +2715,7 @@
           <a:p>
             <a:fld id="{D82884F1-FFEA-405F-9602-3DCA865EDA4E}" type="datetime1">
               <a:rPr lang="en-US" smtClean="0"/>
-              <a:t>1/13/2021</a:t>
+              <a:t>1/15/2021</a:t>
             </a:fld>
             <a:endParaRPr lang="en-US" dirty="0"/>
           </a:p>
@@ -3002,7 +3008,7 @@
           <a:p>
             <a:fld id="{7E18DB4A-8810-4A10-AD5C-D5E2C667F5B3}" type="datetime1">
               <a:rPr lang="en-US" smtClean="0"/>
-              <a:t>1/13/2021</a:t>
+              <a:t>1/15/2021</a:t>
             </a:fld>
             <a:endParaRPr lang="en-US" dirty="0"/>
           </a:p>
@@ -3217,7 +3223,7 @@
           <a:p>
             <a:fld id="{ED291B17-9318-49DB-B28B-6E5994AE9581}" type="datetime1">
               <a:rPr lang="en-US" smtClean="0"/>
-              <a:t>1/13/2021</a:t>
+              <a:t>1/15/2021</a:t>
             </a:fld>
             <a:endParaRPr lang="en-US" dirty="0"/>
           </a:p>
@@ -5424,13 +5430,8 @@
           <a:p>
             <a:r>
               <a:rPr lang="en-US" dirty="0"/>
-              <a:t>Silo is throwing exceptions like Silo unavailable exception and others. We can </a:t>
-            </a:r>
-            <a:r>
-              <a:rPr lang="en-US"/>
-              <a:t>give client more tries.</a:t>
-            </a:r>
-            <a:endParaRPr lang="en-US" dirty="0"/>
+              <a:t>Silo is throwing exceptions like Silo unavailable exception and others. We can give client more tries.</a:t>
+            </a:r>
           </a:p>
         </p:txBody>
       </p:sp>
@@ -5438,6 +5439,674 @@
     <p:extLst>
       <p:ext uri="{BB962C8B-B14F-4D97-AF65-F5344CB8AC3E}">
         <p14:creationId xmlns:p14="http://schemas.microsoft.com/office/powerpoint/2010/main" val="2089910653"/>
+      </p:ext>
+    </p:extLst>
+  </p:cSld>
+  <p:clrMapOvr>
+    <a:masterClrMapping/>
+  </p:clrMapOvr>
+</p:sld>
+</file>
+
+<file path=ppt/slides/slide16.xml><?xml version="1.0" encoding="utf-8"?>
+<p:sld xmlns:a="http://schemas.openxmlformats.org/drawingml/2006/main" xmlns:r="http://schemas.openxmlformats.org/officeDocument/2006/relationships" xmlns:p="http://schemas.openxmlformats.org/presentationml/2006/main">
+  <p:cSld>
+    <p:spTree>
+      <p:nvGrpSpPr>
+        <p:cNvPr id="1" name=""/>
+        <p:cNvGrpSpPr/>
+        <p:nvPr/>
+      </p:nvGrpSpPr>
+      <p:grpSpPr>
+        <a:xfrm>
+          <a:off x="0" y="0"/>
+          <a:ext cx="0" cy="0"/>
+          <a:chOff x="0" y="0"/>
+          <a:chExt cx="0" cy="0"/>
+        </a:xfrm>
+      </p:grpSpPr>
+      <p:sp>
+        <p:nvSpPr>
+          <p:cNvPr id="2" name="Title 1">
+            <a:extLst>
+              <a:ext uri="{FF2B5EF4-FFF2-40B4-BE49-F238E27FC236}">
+                <a16:creationId xmlns:a16="http://schemas.microsoft.com/office/drawing/2014/main" id="{12DAEC6B-1EE7-432B-AEC1-08CB17960DDE}"/>
+              </a:ext>
+            </a:extLst>
+          </p:cNvPr>
+          <p:cNvSpPr>
+            <a:spLocks noGrp="1"/>
+          </p:cNvSpPr>
+          <p:nvPr>
+            <p:ph type="title"/>
+          </p:nvPr>
+        </p:nvSpPr>
+        <p:spPr>
+          <a:xfrm>
+            <a:off x="581192" y="702156"/>
+            <a:ext cx="11029616" cy="489081"/>
+          </a:xfrm>
+        </p:spPr>
+        <p:txBody>
+          <a:bodyPr>
+            <a:normAutofit fontScale="90000"/>
+          </a:bodyPr>
+          <a:lstStyle/>
+          <a:p>
+            <a:r>
+              <a:rPr lang="en-US" dirty="0"/>
+              <a:t>GRAIN PERSISTENCE</a:t>
+            </a:r>
+          </a:p>
+        </p:txBody>
+      </p:sp>
+      <p:sp>
+        <p:nvSpPr>
+          <p:cNvPr id="4" name="TextBox 3">
+            <a:extLst>
+              <a:ext uri="{FF2B5EF4-FFF2-40B4-BE49-F238E27FC236}">
+                <a16:creationId xmlns:a16="http://schemas.microsoft.com/office/drawing/2014/main" id="{F90D7726-9F63-483A-BB2A-9035B662D1CF}"/>
+              </a:ext>
+            </a:extLst>
+          </p:cNvPr>
+          <p:cNvSpPr txBox="1"/>
+          <p:nvPr/>
+        </p:nvSpPr>
+        <p:spPr>
+          <a:xfrm>
+            <a:off x="0" y="1191237"/>
+            <a:ext cx="12381787" cy="1200329"/>
+          </a:xfrm>
+          <a:prstGeom prst="rect">
+            <a:avLst/>
+          </a:prstGeom>
+          <a:noFill/>
+        </p:spPr>
+        <p:txBody>
+          <a:bodyPr wrap="none" rtlCol="0">
+            <a:spAutoFit/>
+          </a:bodyPr>
+          <a:lstStyle/>
+          <a:p>
+            <a:pPr marL="285750" indent="-285750">
+              <a:buFont typeface="Arial" panose="020B0604020202020204" pitchFamily="34" charset="0"/>
+              <a:buChar char="•"/>
+            </a:pPr>
+            <a:r>
+              <a:rPr lang="en-US" dirty="0"/>
+              <a:t>There are many storage providers that are ready to be used like Azure Storage, Azure DynamoDB Storage and many others.</a:t>
+            </a:r>
+          </a:p>
+          <a:p>
+            <a:pPr marL="285750" indent="-285750">
+              <a:buFont typeface="Arial" panose="020B0604020202020204" pitchFamily="34" charset="0"/>
+              <a:buChar char="•"/>
+            </a:pPr>
+            <a:r>
+              <a:rPr lang="en-US" dirty="0"/>
+              <a:t>We are going to use </a:t>
+            </a:r>
+            <a:r>
+              <a:rPr lang="en-US" dirty="0" err="1"/>
+              <a:t>ADO.Net</a:t>
+            </a:r>
+            <a:r>
+              <a:rPr lang="en-US" dirty="0"/>
+              <a:t> provider and PostgreSQL</a:t>
+            </a:r>
+          </a:p>
+          <a:p>
+            <a:r>
+              <a:rPr lang="en-US" dirty="0">
+                <a:hlinkClick r:id="rId2"/>
+              </a:rPr>
+              <a:t>     https://dotnet.github.io/orleans/docs/host/configuration_guide/adonet_configuration.html</a:t>
+            </a:r>
+            <a:endParaRPr lang="en-US" dirty="0"/>
+          </a:p>
+          <a:p>
+            <a:pPr marL="285750" indent="-285750">
+              <a:buFont typeface="Arial" panose="020B0604020202020204" pitchFamily="34" charset="0"/>
+              <a:buChar char="•"/>
+            </a:pPr>
+            <a:endParaRPr lang="en-US" dirty="0"/>
+          </a:p>
+        </p:txBody>
+      </p:sp>
+      <p:pic>
+        <p:nvPicPr>
+          <p:cNvPr id="5" name="Picture 4">
+            <a:extLst>
+              <a:ext uri="{FF2B5EF4-FFF2-40B4-BE49-F238E27FC236}">
+                <a16:creationId xmlns:a16="http://schemas.microsoft.com/office/drawing/2014/main" id="{21A59624-AA08-4E7E-B239-7B15CF599CC3}"/>
+              </a:ext>
+            </a:extLst>
+          </p:cNvPr>
+          <p:cNvPicPr>
+            <a:picLocks noChangeAspect="1"/>
+          </p:cNvPicPr>
+          <p:nvPr/>
+        </p:nvPicPr>
+        <p:blipFill>
+          <a:blip r:embed="rId3"/>
+          <a:stretch>
+            <a:fillRect/>
+          </a:stretch>
+        </p:blipFill>
+        <p:spPr>
+          <a:xfrm>
+            <a:off x="134269" y="2592222"/>
+            <a:ext cx="11029950" cy="3286125"/>
+          </a:xfrm>
+          <a:prstGeom prst="rect">
+            <a:avLst/>
+          </a:prstGeom>
+        </p:spPr>
+      </p:pic>
+      <p:sp>
+        <p:nvSpPr>
+          <p:cNvPr id="6" name="TextBox 5">
+            <a:extLst>
+              <a:ext uri="{FF2B5EF4-FFF2-40B4-BE49-F238E27FC236}">
+                <a16:creationId xmlns:a16="http://schemas.microsoft.com/office/drawing/2014/main" id="{24CB5EE0-CA59-44B7-B5D5-74E436F12B8E}"/>
+              </a:ext>
+            </a:extLst>
+          </p:cNvPr>
+          <p:cNvSpPr txBox="1"/>
+          <p:nvPr/>
+        </p:nvSpPr>
+        <p:spPr>
+          <a:xfrm>
+            <a:off x="134269" y="2206900"/>
+            <a:ext cx="4894289" cy="369332"/>
+          </a:xfrm>
+          <a:prstGeom prst="rect">
+            <a:avLst/>
+          </a:prstGeom>
+          <a:noFill/>
+        </p:spPr>
+        <p:txBody>
+          <a:bodyPr wrap="none" rtlCol="0">
+            <a:spAutoFit/>
+          </a:bodyPr>
+          <a:lstStyle/>
+          <a:p>
+            <a:r>
+              <a:rPr lang="en-US" dirty="0"/>
+              <a:t>Create “Orleans” database cluster in PostgreSQL</a:t>
+            </a:r>
+          </a:p>
+        </p:txBody>
+      </p:sp>
+      <p:pic>
+        <p:nvPicPr>
+          <p:cNvPr id="7" name="Picture 6">
+            <a:extLst>
+              <a:ext uri="{FF2B5EF4-FFF2-40B4-BE49-F238E27FC236}">
+                <a16:creationId xmlns:a16="http://schemas.microsoft.com/office/drawing/2014/main" id="{35B2EB47-D524-46FD-BA58-BCD218385250}"/>
+              </a:ext>
+            </a:extLst>
+          </p:cNvPr>
+          <p:cNvPicPr>
+            <a:picLocks noChangeAspect="1"/>
+          </p:cNvPicPr>
+          <p:nvPr/>
+        </p:nvPicPr>
+        <p:blipFill>
+          <a:blip r:embed="rId4"/>
+          <a:stretch>
+            <a:fillRect/>
+          </a:stretch>
+        </p:blipFill>
+        <p:spPr>
+          <a:xfrm>
+            <a:off x="98558" y="5960319"/>
+            <a:ext cx="6191250" cy="647700"/>
+          </a:xfrm>
+          <a:prstGeom prst="rect">
+            <a:avLst/>
+          </a:prstGeom>
+        </p:spPr>
+      </p:pic>
+    </p:spTree>
+    <p:extLst>
+      <p:ext uri="{BB962C8B-B14F-4D97-AF65-F5344CB8AC3E}">
+        <p14:creationId xmlns:p14="http://schemas.microsoft.com/office/powerpoint/2010/main" val="1914694929"/>
+      </p:ext>
+    </p:extLst>
+  </p:cSld>
+  <p:clrMapOvr>
+    <a:masterClrMapping/>
+  </p:clrMapOvr>
+</p:sld>
+</file>
+
+<file path=ppt/slides/slide17.xml><?xml version="1.0" encoding="utf-8"?>
+<p:sld xmlns:a="http://schemas.openxmlformats.org/drawingml/2006/main" xmlns:r="http://schemas.openxmlformats.org/officeDocument/2006/relationships" xmlns:p="http://schemas.openxmlformats.org/presentationml/2006/main">
+  <p:cSld>
+    <p:spTree>
+      <p:nvGrpSpPr>
+        <p:cNvPr id="1" name=""/>
+        <p:cNvGrpSpPr/>
+        <p:nvPr/>
+      </p:nvGrpSpPr>
+      <p:grpSpPr>
+        <a:xfrm>
+          <a:off x="0" y="0"/>
+          <a:ext cx="0" cy="0"/>
+          <a:chOff x="0" y="0"/>
+          <a:chExt cx="0" cy="0"/>
+        </a:xfrm>
+      </p:grpSpPr>
+      <p:sp>
+        <p:nvSpPr>
+          <p:cNvPr id="2" name="Title 1">
+            <a:extLst>
+              <a:ext uri="{FF2B5EF4-FFF2-40B4-BE49-F238E27FC236}">
+                <a16:creationId xmlns:a16="http://schemas.microsoft.com/office/drawing/2014/main" id="{06336C67-008A-4470-AD58-39218CFC0478}"/>
+              </a:ext>
+            </a:extLst>
+          </p:cNvPr>
+          <p:cNvSpPr>
+            <a:spLocks noGrp="1"/>
+          </p:cNvSpPr>
+          <p:nvPr>
+            <p:ph type="title"/>
+          </p:nvPr>
+        </p:nvSpPr>
+        <p:spPr>
+          <a:xfrm>
+            <a:off x="581192" y="702156"/>
+            <a:ext cx="11029616" cy="454840"/>
+          </a:xfrm>
+        </p:spPr>
+        <p:txBody>
+          <a:bodyPr>
+            <a:normAutofit fontScale="90000"/>
+          </a:bodyPr>
+          <a:lstStyle/>
+          <a:p>
+            <a:r>
+              <a:rPr lang="en-US" dirty="0"/>
+              <a:t>PG ADMIN – Change TO LOADBALANCER</a:t>
+            </a:r>
+          </a:p>
+        </p:txBody>
+      </p:sp>
+      <p:pic>
+        <p:nvPicPr>
+          <p:cNvPr id="6" name="Picture 5">
+            <a:extLst>
+              <a:ext uri="{FF2B5EF4-FFF2-40B4-BE49-F238E27FC236}">
+                <a16:creationId xmlns:a16="http://schemas.microsoft.com/office/drawing/2014/main" id="{3C1E6092-38B8-4744-B3EE-C115A4AD88A4}"/>
+              </a:ext>
+            </a:extLst>
+          </p:cNvPr>
+          <p:cNvPicPr>
+            <a:picLocks noChangeAspect="1"/>
+          </p:cNvPicPr>
+          <p:nvPr/>
+        </p:nvPicPr>
+        <p:blipFill>
+          <a:blip r:embed="rId2"/>
+          <a:stretch>
+            <a:fillRect/>
+          </a:stretch>
+        </p:blipFill>
+        <p:spPr>
+          <a:xfrm>
+            <a:off x="0" y="1573620"/>
+            <a:ext cx="9863609" cy="4580389"/>
+          </a:xfrm>
+          <a:prstGeom prst="rect">
+            <a:avLst/>
+          </a:prstGeom>
+        </p:spPr>
+      </p:pic>
+      <p:pic>
+        <p:nvPicPr>
+          <p:cNvPr id="7" name="Picture 6">
+            <a:extLst>
+              <a:ext uri="{FF2B5EF4-FFF2-40B4-BE49-F238E27FC236}">
+                <a16:creationId xmlns:a16="http://schemas.microsoft.com/office/drawing/2014/main" id="{18F64485-4184-4AB3-BF93-132A2AF04E08}"/>
+              </a:ext>
+            </a:extLst>
+          </p:cNvPr>
+          <p:cNvPicPr>
+            <a:picLocks noChangeAspect="1"/>
+          </p:cNvPicPr>
+          <p:nvPr/>
+        </p:nvPicPr>
+        <p:blipFill>
+          <a:blip r:embed="rId3"/>
+          <a:stretch>
+            <a:fillRect/>
+          </a:stretch>
+        </p:blipFill>
+        <p:spPr>
+          <a:xfrm>
+            <a:off x="0" y="1064834"/>
+            <a:ext cx="8172450" cy="466725"/>
+          </a:xfrm>
+          <a:prstGeom prst="rect">
+            <a:avLst/>
+          </a:prstGeom>
+        </p:spPr>
+      </p:pic>
+      <p:pic>
+        <p:nvPicPr>
+          <p:cNvPr id="8" name="Picture 7">
+            <a:extLst>
+              <a:ext uri="{FF2B5EF4-FFF2-40B4-BE49-F238E27FC236}">
+                <a16:creationId xmlns:a16="http://schemas.microsoft.com/office/drawing/2014/main" id="{B7461AD6-682B-49E7-A42A-438589FAE873}"/>
+              </a:ext>
+            </a:extLst>
+          </p:cNvPr>
+          <p:cNvPicPr>
+            <a:picLocks noChangeAspect="1"/>
+          </p:cNvPicPr>
+          <p:nvPr/>
+        </p:nvPicPr>
+        <p:blipFill>
+          <a:blip r:embed="rId4"/>
+          <a:stretch>
+            <a:fillRect/>
+          </a:stretch>
+        </p:blipFill>
+        <p:spPr>
+          <a:xfrm>
+            <a:off x="0" y="6274326"/>
+            <a:ext cx="12192000" cy="215197"/>
+          </a:xfrm>
+          <a:prstGeom prst="rect">
+            <a:avLst/>
+          </a:prstGeom>
+        </p:spPr>
+      </p:pic>
+    </p:spTree>
+    <p:extLst>
+      <p:ext uri="{BB962C8B-B14F-4D97-AF65-F5344CB8AC3E}">
+        <p14:creationId xmlns:p14="http://schemas.microsoft.com/office/powerpoint/2010/main" val="3462794851"/>
+      </p:ext>
+    </p:extLst>
+  </p:cSld>
+  <p:clrMapOvr>
+    <a:masterClrMapping/>
+  </p:clrMapOvr>
+</p:sld>
+</file>
+
+<file path=ppt/slides/slide18.xml><?xml version="1.0" encoding="utf-8"?>
+<p:sld xmlns:a="http://schemas.openxmlformats.org/drawingml/2006/main" xmlns:r="http://schemas.openxmlformats.org/officeDocument/2006/relationships" xmlns:p="http://schemas.openxmlformats.org/presentationml/2006/main">
+  <p:cSld>
+    <p:spTree>
+      <p:nvGrpSpPr>
+        <p:cNvPr id="1" name=""/>
+        <p:cNvGrpSpPr/>
+        <p:nvPr/>
+      </p:nvGrpSpPr>
+      <p:grpSpPr>
+        <a:xfrm>
+          <a:off x="0" y="0"/>
+          <a:ext cx="0" cy="0"/>
+          <a:chOff x="0" y="0"/>
+          <a:chExt cx="0" cy="0"/>
+        </a:xfrm>
+      </p:grpSpPr>
+      <p:sp>
+        <p:nvSpPr>
+          <p:cNvPr id="2" name="Title 1">
+            <a:extLst>
+              <a:ext uri="{FF2B5EF4-FFF2-40B4-BE49-F238E27FC236}">
+                <a16:creationId xmlns:a16="http://schemas.microsoft.com/office/drawing/2014/main" id="{A4DCF2F9-7A4F-4D23-8F9B-58264EFAE521}"/>
+              </a:ext>
+            </a:extLst>
+          </p:cNvPr>
+          <p:cNvSpPr>
+            <a:spLocks noGrp="1"/>
+          </p:cNvSpPr>
+          <p:nvPr>
+            <p:ph type="title"/>
+          </p:nvPr>
+        </p:nvSpPr>
+        <p:spPr>
+          <a:xfrm>
+            <a:off x="581192" y="702156"/>
+            <a:ext cx="11029616" cy="473501"/>
+          </a:xfrm>
+        </p:spPr>
+        <p:txBody>
+          <a:bodyPr>
+            <a:normAutofit fontScale="90000"/>
+          </a:bodyPr>
+          <a:lstStyle/>
+          <a:p>
+            <a:r>
+              <a:rPr lang="en-US" dirty="0" err="1"/>
+              <a:t>LogiN</a:t>
+            </a:r>
+            <a:r>
+              <a:rPr lang="en-US" dirty="0"/>
+              <a:t> INTO PGADMIN</a:t>
+            </a:r>
+          </a:p>
+        </p:txBody>
+      </p:sp>
+      <p:pic>
+        <p:nvPicPr>
+          <p:cNvPr id="4" name="Picture 3">
+            <a:extLst>
+              <a:ext uri="{FF2B5EF4-FFF2-40B4-BE49-F238E27FC236}">
+                <a16:creationId xmlns:a16="http://schemas.microsoft.com/office/drawing/2014/main" id="{DE2E1320-40DA-421C-8388-7A48F14DF82D}"/>
+              </a:ext>
+            </a:extLst>
+          </p:cNvPr>
+          <p:cNvPicPr>
+            <a:picLocks noChangeAspect="1"/>
+          </p:cNvPicPr>
+          <p:nvPr/>
+        </p:nvPicPr>
+        <p:blipFill>
+          <a:blip r:embed="rId2"/>
+          <a:stretch>
+            <a:fillRect/>
+          </a:stretch>
+        </p:blipFill>
+        <p:spPr>
+          <a:xfrm>
+            <a:off x="581192" y="1404937"/>
+            <a:ext cx="8772525" cy="4048125"/>
+          </a:xfrm>
+          <a:prstGeom prst="rect">
+            <a:avLst/>
+          </a:prstGeom>
+        </p:spPr>
+      </p:pic>
+    </p:spTree>
+    <p:extLst>
+      <p:ext uri="{BB962C8B-B14F-4D97-AF65-F5344CB8AC3E}">
+        <p14:creationId xmlns:p14="http://schemas.microsoft.com/office/powerpoint/2010/main" val="2105352744"/>
+      </p:ext>
+    </p:extLst>
+  </p:cSld>
+  <p:clrMapOvr>
+    <a:masterClrMapping/>
+  </p:clrMapOvr>
+</p:sld>
+</file>
+
+<file path=ppt/slides/slide19.xml><?xml version="1.0" encoding="utf-8"?>
+<p:sld xmlns:a="http://schemas.openxmlformats.org/drawingml/2006/main" xmlns:r="http://schemas.openxmlformats.org/officeDocument/2006/relationships" xmlns:p="http://schemas.openxmlformats.org/presentationml/2006/main">
+  <p:cSld>
+    <p:spTree>
+      <p:nvGrpSpPr>
+        <p:cNvPr id="1" name=""/>
+        <p:cNvGrpSpPr/>
+        <p:nvPr/>
+      </p:nvGrpSpPr>
+      <p:grpSpPr>
+        <a:xfrm>
+          <a:off x="0" y="0"/>
+          <a:ext cx="0" cy="0"/>
+          <a:chOff x="0" y="0"/>
+          <a:chExt cx="0" cy="0"/>
+        </a:xfrm>
+      </p:grpSpPr>
+      <p:sp>
+        <p:nvSpPr>
+          <p:cNvPr id="2" name="Title 1">
+            <a:extLst>
+              <a:ext uri="{FF2B5EF4-FFF2-40B4-BE49-F238E27FC236}">
+                <a16:creationId xmlns:a16="http://schemas.microsoft.com/office/drawing/2014/main" id="{DF5EF51E-2D9D-49D2-8EAB-72EDDD9BA7D5}"/>
+              </a:ext>
+            </a:extLst>
+          </p:cNvPr>
+          <p:cNvSpPr>
+            <a:spLocks noGrp="1"/>
+          </p:cNvSpPr>
+          <p:nvPr>
+            <p:ph type="title"/>
+          </p:nvPr>
+        </p:nvSpPr>
+        <p:spPr>
+          <a:xfrm>
+            <a:off x="581192" y="702156"/>
+            <a:ext cx="11029616" cy="482832"/>
+          </a:xfrm>
+        </p:spPr>
+        <p:txBody>
+          <a:bodyPr>
+            <a:normAutofit fontScale="90000"/>
+          </a:bodyPr>
+          <a:lstStyle/>
+          <a:p>
+            <a:r>
+              <a:rPr lang="en-US" dirty="0"/>
+              <a:t>PostgreSQL SCRIPT </a:t>
+            </a:r>
+          </a:p>
+        </p:txBody>
+      </p:sp>
+      <p:sp>
+        <p:nvSpPr>
+          <p:cNvPr id="4" name="TextBox 3">
+            <a:extLst>
+              <a:ext uri="{FF2B5EF4-FFF2-40B4-BE49-F238E27FC236}">
+                <a16:creationId xmlns:a16="http://schemas.microsoft.com/office/drawing/2014/main" id="{0665DC9B-00EA-4902-BF9A-3003EEAAE0D2}"/>
+              </a:ext>
+            </a:extLst>
+          </p:cNvPr>
+          <p:cNvSpPr txBox="1"/>
+          <p:nvPr/>
+        </p:nvSpPr>
+        <p:spPr>
+          <a:xfrm>
+            <a:off x="83976" y="1259633"/>
+            <a:ext cx="11926788" cy="2585323"/>
+          </a:xfrm>
+          <a:prstGeom prst="rect">
+            <a:avLst/>
+          </a:prstGeom>
+          <a:noFill/>
+        </p:spPr>
+        <p:txBody>
+          <a:bodyPr wrap="square" rtlCol="0">
+            <a:spAutoFit/>
+          </a:bodyPr>
+          <a:lstStyle/>
+          <a:p>
+            <a:r>
+              <a:rPr lang="en-US" dirty="0"/>
+              <a:t>Main Link:</a:t>
+            </a:r>
+          </a:p>
+          <a:p>
+            <a:r>
+              <a:rPr lang="en-US" dirty="0">
+                <a:hlinkClick r:id="rId2"/>
+              </a:rPr>
+              <a:t>https://dotnet.github.io/orleans/docs/host/configuration_guide/adonet_configuration.html</a:t>
+            </a:r>
+            <a:r>
+              <a:rPr lang="en-US" dirty="0"/>
+              <a:t> </a:t>
+            </a:r>
+          </a:p>
+          <a:p>
+            <a:r>
+              <a:rPr lang="en-US" dirty="0"/>
+              <a:t>Execute Main Script : </a:t>
+            </a:r>
+          </a:p>
+          <a:p>
+            <a:r>
+              <a:rPr lang="en-US" dirty="0">
+                <a:hlinkClick r:id="rId3"/>
+              </a:rPr>
+              <a:t>https://github.com/dotnet/orleans/blob/master/src/AdoNet/Shared/PostgreSQL-Main.sql</a:t>
+            </a:r>
+            <a:endParaRPr lang="en-US" dirty="0"/>
+          </a:p>
+          <a:p>
+            <a:r>
+              <a:rPr lang="en-US" dirty="0"/>
+              <a:t>Execute Persistence Script : </a:t>
+            </a:r>
+          </a:p>
+          <a:p>
+            <a:r>
+              <a:rPr lang="en-US" dirty="0">
+                <a:hlinkClick r:id="rId4"/>
+              </a:rPr>
+              <a:t>https://github.com/dotnet/orleans/blob/master/src/AdoNet/Orleans.Persistence.AdoNet/PostgreSQL-Persistence.sql</a:t>
+            </a:r>
+            <a:endParaRPr lang="en-US" dirty="0"/>
+          </a:p>
+          <a:p>
+            <a:endParaRPr lang="en-US" dirty="0"/>
+          </a:p>
+          <a:p>
+            <a:endParaRPr lang="en-US" dirty="0"/>
+          </a:p>
+          <a:p>
+            <a:endParaRPr lang="en-US" dirty="0"/>
+          </a:p>
+        </p:txBody>
+      </p:sp>
+      <p:pic>
+        <p:nvPicPr>
+          <p:cNvPr id="6" name="Picture 5">
+            <a:extLst>
+              <a:ext uri="{FF2B5EF4-FFF2-40B4-BE49-F238E27FC236}">
+                <a16:creationId xmlns:a16="http://schemas.microsoft.com/office/drawing/2014/main" id="{DD69BDC6-69A8-409F-90C9-F7546F199A67}"/>
+              </a:ext>
+            </a:extLst>
+          </p:cNvPr>
+          <p:cNvPicPr>
+            <a:picLocks noChangeAspect="1"/>
+          </p:cNvPicPr>
+          <p:nvPr/>
+        </p:nvPicPr>
+        <p:blipFill>
+          <a:blip r:embed="rId5"/>
+          <a:stretch>
+            <a:fillRect/>
+          </a:stretch>
+        </p:blipFill>
+        <p:spPr>
+          <a:xfrm>
+            <a:off x="83976" y="3079101"/>
+            <a:ext cx="7505700" cy="3781119"/>
+          </a:xfrm>
+          <a:prstGeom prst="rect">
+            <a:avLst/>
+          </a:prstGeom>
+        </p:spPr>
+      </p:pic>
+    </p:spTree>
+    <p:extLst>
+      <p:ext uri="{BB962C8B-B14F-4D97-AF65-F5344CB8AC3E}">
+        <p14:creationId xmlns:p14="http://schemas.microsoft.com/office/powerpoint/2010/main" val="3552251709"/>
       </p:ext>
     </p:extLst>
   </p:cSld>
@@ -5613,6 +6282,259 @@
     <p:extLst>
       <p:ext uri="{BB962C8B-B14F-4D97-AF65-F5344CB8AC3E}">
         <p14:creationId xmlns:p14="http://schemas.microsoft.com/office/powerpoint/2010/main" val="2304533217"/>
+      </p:ext>
+    </p:extLst>
+  </p:cSld>
+  <p:clrMapOvr>
+    <a:masterClrMapping/>
+  </p:clrMapOvr>
+</p:sld>
+</file>
+
+<file path=ppt/slides/slide20.xml><?xml version="1.0" encoding="utf-8"?>
+<p:sld xmlns:a="http://schemas.openxmlformats.org/drawingml/2006/main" xmlns:r="http://schemas.openxmlformats.org/officeDocument/2006/relationships" xmlns:p="http://schemas.openxmlformats.org/presentationml/2006/main">
+  <p:cSld>
+    <p:spTree>
+      <p:nvGrpSpPr>
+        <p:cNvPr id="1" name=""/>
+        <p:cNvGrpSpPr/>
+        <p:nvPr/>
+      </p:nvGrpSpPr>
+      <p:grpSpPr>
+        <a:xfrm>
+          <a:off x="0" y="0"/>
+          <a:ext cx="0" cy="0"/>
+          <a:chOff x="0" y="0"/>
+          <a:chExt cx="0" cy="0"/>
+        </a:xfrm>
+      </p:grpSpPr>
+      <p:sp>
+        <p:nvSpPr>
+          <p:cNvPr id="2" name="Title 1">
+            <a:extLst>
+              <a:ext uri="{FF2B5EF4-FFF2-40B4-BE49-F238E27FC236}">
+                <a16:creationId xmlns:a16="http://schemas.microsoft.com/office/drawing/2014/main" id="{C50D33BB-4D77-454D-994C-C355282D56DE}"/>
+              </a:ext>
+            </a:extLst>
+          </p:cNvPr>
+          <p:cNvSpPr>
+            <a:spLocks noGrp="1"/>
+          </p:cNvSpPr>
+          <p:nvPr>
+            <p:ph type="title"/>
+          </p:nvPr>
+        </p:nvSpPr>
+        <p:spPr>
+          <a:xfrm>
+            <a:off x="581192" y="702156"/>
+            <a:ext cx="11029616" cy="464171"/>
+          </a:xfrm>
+        </p:spPr>
+        <p:txBody>
+          <a:bodyPr>
+            <a:normAutofit fontScale="90000"/>
+          </a:bodyPr>
+          <a:lstStyle/>
+          <a:p>
+            <a:r>
+              <a:rPr lang="en-US" dirty="0"/>
+              <a:t>ORLEANS – Kubernetes SERVICE to </a:t>
+            </a:r>
+            <a:r>
+              <a:rPr lang="en-US" dirty="0" err="1"/>
+              <a:t>loadbalancer</a:t>
+            </a:r>
+            <a:endParaRPr lang="en-US" dirty="0"/>
+          </a:p>
+        </p:txBody>
+      </p:sp>
+      <p:pic>
+        <p:nvPicPr>
+          <p:cNvPr id="4" name="Picture 3">
+            <a:extLst>
+              <a:ext uri="{FF2B5EF4-FFF2-40B4-BE49-F238E27FC236}">
+                <a16:creationId xmlns:a16="http://schemas.microsoft.com/office/drawing/2014/main" id="{DE7A77CA-B28A-450A-A80E-20CDE6B4622D}"/>
+              </a:ext>
+            </a:extLst>
+          </p:cNvPr>
+          <p:cNvPicPr>
+            <a:picLocks noChangeAspect="1"/>
+          </p:cNvPicPr>
+          <p:nvPr/>
+        </p:nvPicPr>
+        <p:blipFill>
+          <a:blip r:embed="rId2"/>
+          <a:stretch>
+            <a:fillRect/>
+          </a:stretch>
+        </p:blipFill>
+        <p:spPr>
+          <a:xfrm>
+            <a:off x="74645" y="1586204"/>
+            <a:ext cx="8287760" cy="4329404"/>
+          </a:xfrm>
+          <a:prstGeom prst="rect">
+            <a:avLst/>
+          </a:prstGeom>
+        </p:spPr>
+      </p:pic>
+      <p:pic>
+        <p:nvPicPr>
+          <p:cNvPr id="5" name="Picture 4">
+            <a:extLst>
+              <a:ext uri="{FF2B5EF4-FFF2-40B4-BE49-F238E27FC236}">
+                <a16:creationId xmlns:a16="http://schemas.microsoft.com/office/drawing/2014/main" id="{217CAB1B-DDAB-4108-BD57-3D164C92C52D}"/>
+              </a:ext>
+            </a:extLst>
+          </p:cNvPr>
+          <p:cNvPicPr>
+            <a:picLocks noChangeAspect="1"/>
+          </p:cNvPicPr>
+          <p:nvPr/>
+        </p:nvPicPr>
+        <p:blipFill>
+          <a:blip r:embed="rId3"/>
+          <a:stretch>
+            <a:fillRect/>
+          </a:stretch>
+        </p:blipFill>
+        <p:spPr>
+          <a:xfrm>
+            <a:off x="74645" y="1138529"/>
+            <a:ext cx="7429500" cy="447675"/>
+          </a:xfrm>
+          <a:prstGeom prst="rect">
+            <a:avLst/>
+          </a:prstGeom>
+        </p:spPr>
+      </p:pic>
+      <p:pic>
+        <p:nvPicPr>
+          <p:cNvPr id="6" name="Picture 5">
+            <a:extLst>
+              <a:ext uri="{FF2B5EF4-FFF2-40B4-BE49-F238E27FC236}">
+                <a16:creationId xmlns:a16="http://schemas.microsoft.com/office/drawing/2014/main" id="{E47B86DF-3FBF-4608-A2FC-6E7018DC81C0}"/>
+              </a:ext>
+            </a:extLst>
+          </p:cNvPr>
+          <p:cNvPicPr>
+            <a:picLocks noChangeAspect="1"/>
+          </p:cNvPicPr>
+          <p:nvPr/>
+        </p:nvPicPr>
+        <p:blipFill>
+          <a:blip r:embed="rId4"/>
+          <a:stretch>
+            <a:fillRect/>
+          </a:stretch>
+        </p:blipFill>
+        <p:spPr>
+          <a:xfrm>
+            <a:off x="0" y="6056419"/>
+            <a:ext cx="12192000" cy="194235"/>
+          </a:xfrm>
+          <a:prstGeom prst="rect">
+            <a:avLst/>
+          </a:prstGeom>
+        </p:spPr>
+      </p:pic>
+    </p:spTree>
+    <p:extLst>
+      <p:ext uri="{BB962C8B-B14F-4D97-AF65-F5344CB8AC3E}">
+        <p14:creationId xmlns:p14="http://schemas.microsoft.com/office/powerpoint/2010/main" val="2676088131"/>
+      </p:ext>
+    </p:extLst>
+  </p:cSld>
+  <p:clrMapOvr>
+    <a:masterClrMapping/>
+  </p:clrMapOvr>
+</p:sld>
+</file>
+
+<file path=ppt/slides/slide21.xml><?xml version="1.0" encoding="utf-8"?>
+<p:sld xmlns:a="http://schemas.openxmlformats.org/drawingml/2006/main" xmlns:r="http://schemas.openxmlformats.org/officeDocument/2006/relationships" xmlns:p="http://schemas.openxmlformats.org/presentationml/2006/main">
+  <p:cSld>
+    <p:spTree>
+      <p:nvGrpSpPr>
+        <p:cNvPr id="1" name=""/>
+        <p:cNvGrpSpPr/>
+        <p:nvPr/>
+      </p:nvGrpSpPr>
+      <p:grpSpPr>
+        <a:xfrm>
+          <a:off x="0" y="0"/>
+          <a:ext cx="0" cy="0"/>
+          <a:chOff x="0" y="0"/>
+          <a:chExt cx="0" cy="0"/>
+        </a:xfrm>
+      </p:grpSpPr>
+      <p:sp>
+        <p:nvSpPr>
+          <p:cNvPr id="2" name="Title 1">
+            <a:extLst>
+              <a:ext uri="{FF2B5EF4-FFF2-40B4-BE49-F238E27FC236}">
+                <a16:creationId xmlns:a16="http://schemas.microsoft.com/office/drawing/2014/main" id="{DBEC2ECE-7D62-4E57-BA7D-EE5E73A7C33B}"/>
+              </a:ext>
+            </a:extLst>
+          </p:cNvPr>
+          <p:cNvSpPr>
+            <a:spLocks noGrp="1"/>
+          </p:cNvSpPr>
+          <p:nvPr>
+            <p:ph type="title"/>
+          </p:nvPr>
+        </p:nvSpPr>
+        <p:spPr>
+          <a:xfrm>
+            <a:off x="581192" y="702156"/>
+            <a:ext cx="11029616" cy="538815"/>
+          </a:xfrm>
+        </p:spPr>
+        <p:txBody>
+          <a:bodyPr/>
+          <a:lstStyle/>
+          <a:p>
+            <a:r>
+              <a:rPr lang="en-US" dirty="0"/>
+              <a:t>SILO Persistence</a:t>
+            </a:r>
+          </a:p>
+        </p:txBody>
+      </p:sp>
+      <p:pic>
+        <p:nvPicPr>
+          <p:cNvPr id="5" name="Picture 4">
+            <a:extLst>
+              <a:ext uri="{FF2B5EF4-FFF2-40B4-BE49-F238E27FC236}">
+                <a16:creationId xmlns:a16="http://schemas.microsoft.com/office/drawing/2014/main" id="{A91BA02A-5A12-497F-8501-78E3F0F97B68}"/>
+              </a:ext>
+            </a:extLst>
+          </p:cNvPr>
+          <p:cNvPicPr>
+            <a:picLocks noChangeAspect="1"/>
+          </p:cNvPicPr>
+          <p:nvPr/>
+        </p:nvPicPr>
+        <p:blipFill>
+          <a:blip r:embed="rId2"/>
+          <a:stretch>
+            <a:fillRect/>
+          </a:stretch>
+        </p:blipFill>
+        <p:spPr>
+          <a:xfrm>
+            <a:off x="74062" y="1312214"/>
+            <a:ext cx="9505950" cy="1247775"/>
+          </a:xfrm>
+          <a:prstGeom prst="rect">
+            <a:avLst/>
+          </a:prstGeom>
+        </p:spPr>
+      </p:pic>
+    </p:spTree>
+    <p:extLst>
+      <p:ext uri="{BB962C8B-B14F-4D97-AF65-F5344CB8AC3E}">
+        <p14:creationId xmlns:p14="http://schemas.microsoft.com/office/powerpoint/2010/main" val="4291159064"/>
       </p:ext>
     </p:extLst>
   </p:cSld>
@@ -7080,24 +8002,6 @@
 </file>
 
 <file path=customXml/item1.xml><?xml version="1.0" encoding="utf-8"?>
-<p:properties xmlns:p="http://schemas.microsoft.com/office/2006/metadata/properties" xmlns:xsi="http://www.w3.org/2001/XMLSchema-instance" xmlns:pc="http://schemas.microsoft.com/office/infopath/2007/PartnerControls">
-  <documentManagement>
-    <Status xmlns="71af3243-3dd4-4a8d-8c0d-dd76da1f02a5">Not started</Status>
-    <MediaServiceKeyPoints xmlns="71af3243-3dd4-4a8d-8c0d-dd76da1f02a5" xsi:nil="true"/>
-  </documentManagement>
-</p:properties>
-</file>
-
-<file path=customXml/item2.xml><?xml version="1.0" encoding="utf-8"?>
-<?mso-contentType ?>
-<FormTemplates xmlns="http://schemas.microsoft.com/sharepoint/v3/contenttype/forms">
-  <Display>DocumentLibraryForm</Display>
-  <Edit>DocumentLibraryForm</Edit>
-  <New>DocumentLibraryForm</New>
-</FormTemplates>
-</file>
-
-<file path=customXml/item3.xml><?xml version="1.0" encoding="utf-8"?>
 <ct:contentTypeSchema xmlns:ct="http://schemas.microsoft.com/office/2006/metadata/contentType" xmlns:ma="http://schemas.microsoft.com/office/2006/metadata/properties/metaAttributes" ct:_="" ma:_="" ma:contentTypeName="Document" ma:contentTypeID="0x01010079F111ED35F8CC479449609E8A0923A6" ma:contentTypeVersion="12" ma:contentTypeDescription="Create a new document." ma:contentTypeScope="" ma:versionID="a410dd7f93c95333ffa1b60ed6adedd1">
   <xsd:schema xmlns:xsd="http://www.w3.org/2001/XMLSchema" xmlns:xs="http://www.w3.org/2001/XMLSchema" xmlns:p="http://schemas.microsoft.com/office/2006/metadata/properties" xmlns:ns2="71af3243-3dd4-4a8d-8c0d-dd76da1f02a5" xmlns:ns3="16c05727-aa75-4e4a-9b5f-8a80a1165891" targetNamespace="http://schemas.microsoft.com/office/2006/metadata/properties" ma:root="true" ma:fieldsID="a936d9baba76aa3866493feff160faab" ns2:_="" ns3:_="">
     <xsd:import namespace="71af3243-3dd4-4a8d-8c0d-dd76da1f02a5"/>
@@ -7318,25 +8222,25 @@
 </ct:contentTypeSchema>
 </file>
 
-<file path=customXml/itemProps1.xml><?xml version="1.0" encoding="utf-8"?>
-<ds:datastoreItem xmlns:ds="http://schemas.openxmlformats.org/officeDocument/2006/customXml" ds:itemID="{8D289AE2-D2AE-49D1-AFAC-3A79F6794255}">
-  <ds:schemaRefs>
-    <ds:schemaRef ds:uri="http://schemas.microsoft.com/office/2006/metadata/properties"/>
-    <ds:schemaRef ds:uri="http://schemas.microsoft.com/office/infopath/2007/PartnerControls"/>
-    <ds:schemaRef ds:uri="71af3243-3dd4-4a8d-8c0d-dd76da1f02a5"/>
-  </ds:schemaRefs>
-</ds:datastoreItem>
+<file path=customXml/item2.xml><?xml version="1.0" encoding="utf-8"?>
+<?mso-contentType ?>
+<FormTemplates xmlns="http://schemas.microsoft.com/sharepoint/v3/contenttype/forms">
+  <Display>DocumentLibraryForm</Display>
+  <Edit>DocumentLibraryForm</Edit>
+  <New>DocumentLibraryForm</New>
+</FormTemplates>
 </file>
 
-<file path=customXml/itemProps2.xml><?xml version="1.0" encoding="utf-8"?>
-<ds:datastoreItem xmlns:ds="http://schemas.openxmlformats.org/officeDocument/2006/customXml" ds:itemID="{927BD4C1-B6B1-4715-ABF9-E660A51A4EA0}">
-  <ds:schemaRefs>
-    <ds:schemaRef ds:uri="http://schemas.microsoft.com/sharepoint/v3/contenttype/forms"/>
-  </ds:schemaRefs>
-</ds:datastoreItem>
+<file path=customXml/item3.xml><?xml version="1.0" encoding="utf-8"?>
+<p:properties xmlns:p="http://schemas.microsoft.com/office/2006/metadata/properties" xmlns:xsi="http://www.w3.org/2001/XMLSchema-instance" xmlns:pc="http://schemas.microsoft.com/office/infopath/2007/PartnerControls">
+  <documentManagement>
+    <Status xmlns="71af3243-3dd4-4a8d-8c0d-dd76da1f02a5">Not started</Status>
+    <MediaServiceKeyPoints xmlns="71af3243-3dd4-4a8d-8c0d-dd76da1f02a5" xsi:nil="true"/>
+  </documentManagement>
+</p:properties>
 </file>
 
-<file path=customXml/itemProps3.xml><?xml version="1.0" encoding="utf-8"?>
+<file path=customXml/itemProps1.xml><?xml version="1.0" encoding="utf-8"?>
 <ds:datastoreItem xmlns:ds="http://schemas.openxmlformats.org/officeDocument/2006/customXml" ds:itemID="{41E7CA09-9778-4414-AE97-8064B12DA30E}">
   <ds:schemaRefs>
     <ds:schemaRef ds:uri="http://schemas.microsoft.com/office/2006/metadata/contentType"/>
@@ -7353,4 +8257,22 @@
     <ds:schemaRef ds:uri="http://schemas.microsoft.com/internal/obd"/>
   </ds:schemaRefs>
 </ds:datastoreItem>
+</file>
+
+<file path=customXml/itemProps2.xml><?xml version="1.0" encoding="utf-8"?>
+<ds:datastoreItem xmlns:ds="http://schemas.openxmlformats.org/officeDocument/2006/customXml" ds:itemID="{927BD4C1-B6B1-4715-ABF9-E660A51A4EA0}">
+  <ds:schemaRefs>
+    <ds:schemaRef ds:uri="http://schemas.microsoft.com/sharepoint/v3/contenttype/forms"/>
+  </ds:schemaRefs>
+</ds:datastoreItem>
+</file>
+
+<file path=customXml/itemProps3.xml><?xml version="1.0" encoding="utf-8"?>
+<ds:datastoreItem xmlns:ds="http://schemas.openxmlformats.org/officeDocument/2006/customXml" ds:itemID="{8D289AE2-D2AE-49D1-AFAC-3A79F6794255}">
+  <ds:schemaRefs>
+    <ds:schemaRef ds:uri="http://schemas.microsoft.com/office/2006/metadata/properties"/>
+    <ds:schemaRef ds:uri="http://schemas.microsoft.com/office/infopath/2007/PartnerControls"/>
+    <ds:schemaRef ds:uri="71af3243-3dd4-4a8d-8c0d-dd76da1f02a5"/>
+  </ds:schemaRefs>
+</ds:datastoreItem>
 </file>
</xml_diff>

<commit_message>
Automate Sql Scripts Deployment with DbUp.
</commit_message>
<xml_diff>
--- a/Presentation/Microsoft Orleans.pptx
+++ b/Presentation/Microsoft Orleans.pptx
@@ -25,7 +25,8 @@
     <p:sldId id="275" r:id="rId22"/>
     <p:sldId id="276" r:id="rId23"/>
     <p:sldId id="277" r:id="rId24"/>
-    <p:sldId id="278" r:id="rId25"/>
+    <p:sldId id="279" r:id="rId25"/>
+    <p:sldId id="278" r:id="rId26"/>
   </p:sldIdLst>
   <p:sldSz cx="12192000" cy="6858000"/>
   <p:notesSz cx="6858000" cy="9144000"/>
@@ -6452,6 +6453,148 @@
 </file>
 
 <file path=ppt/slides/slide21.xml><?xml version="1.0" encoding="utf-8"?>
+<p:sld xmlns:a="http://schemas.openxmlformats.org/drawingml/2006/main" xmlns:r="http://schemas.openxmlformats.org/officeDocument/2006/relationships" xmlns:p="http://schemas.openxmlformats.org/presentationml/2006/main">
+  <p:cSld>
+    <p:spTree>
+      <p:nvGrpSpPr>
+        <p:cNvPr id="1" name=""/>
+        <p:cNvGrpSpPr/>
+        <p:nvPr/>
+      </p:nvGrpSpPr>
+      <p:grpSpPr>
+        <a:xfrm>
+          <a:off x="0" y="0"/>
+          <a:ext cx="0" cy="0"/>
+          <a:chOff x="0" y="0"/>
+          <a:chExt cx="0" cy="0"/>
+        </a:xfrm>
+      </p:grpSpPr>
+      <p:sp>
+        <p:nvSpPr>
+          <p:cNvPr id="2" name="Title 1">
+            <a:extLst>
+              <a:ext uri="{FF2B5EF4-FFF2-40B4-BE49-F238E27FC236}">
+                <a16:creationId xmlns:a16="http://schemas.microsoft.com/office/drawing/2014/main" id="{C8D8D7E6-BA1D-47FF-9DA3-A46254A6702E}"/>
+              </a:ext>
+            </a:extLst>
+          </p:cNvPr>
+          <p:cNvSpPr>
+            <a:spLocks noGrp="1"/>
+          </p:cNvSpPr>
+          <p:nvPr>
+            <p:ph type="title"/>
+          </p:nvPr>
+        </p:nvSpPr>
+        <p:spPr>
+          <a:xfrm>
+            <a:off x="581192" y="702156"/>
+            <a:ext cx="11029616" cy="438747"/>
+          </a:xfrm>
+        </p:spPr>
+        <p:txBody>
+          <a:bodyPr>
+            <a:normAutofit fontScale="90000"/>
+          </a:bodyPr>
+          <a:lstStyle/>
+          <a:p>
+            <a:r>
+              <a:rPr lang="en-US" dirty="0"/>
+              <a:t>Automatic SQL Scripts deployment with </a:t>
+            </a:r>
+            <a:r>
+              <a:rPr lang="en-US" dirty="0" err="1"/>
+              <a:t>dbup</a:t>
+            </a:r>
+            <a:r>
+              <a:rPr lang="en-US" dirty="0"/>
+              <a:t> library</a:t>
+            </a:r>
+          </a:p>
+        </p:txBody>
+      </p:sp>
+      <p:sp>
+        <p:nvSpPr>
+          <p:cNvPr id="4" name="TextBox 3">
+            <a:extLst>
+              <a:ext uri="{FF2B5EF4-FFF2-40B4-BE49-F238E27FC236}">
+                <a16:creationId xmlns:a16="http://schemas.microsoft.com/office/drawing/2014/main" id="{FF3B1E81-0CE5-4F69-B8E7-CDE113D17019}"/>
+              </a:ext>
+            </a:extLst>
+          </p:cNvPr>
+          <p:cNvSpPr txBox="1"/>
+          <p:nvPr/>
+        </p:nvSpPr>
+        <p:spPr>
+          <a:xfrm>
+            <a:off x="119271" y="1140903"/>
+            <a:ext cx="12072729" cy="1477328"/>
+          </a:xfrm>
+          <a:prstGeom prst="rect">
+            <a:avLst/>
+          </a:prstGeom>
+          <a:noFill/>
+        </p:spPr>
+        <p:txBody>
+          <a:bodyPr wrap="none" rtlCol="0">
+            <a:spAutoFit/>
+          </a:bodyPr>
+          <a:lstStyle/>
+          <a:p>
+            <a:pPr marL="285750" indent="-285750">
+              <a:buFont typeface="Arial" panose="020B0604020202020204" pitchFamily="34" charset="0"/>
+              <a:buChar char="•"/>
+            </a:pPr>
+            <a:r>
+              <a:rPr lang="en-US" dirty="0"/>
+              <a:t>In the previous slides, we must manually run two SQL scripts to create DB structure for  grain persistence.</a:t>
+            </a:r>
+          </a:p>
+          <a:p>
+            <a:endParaRPr lang="en-US" dirty="0"/>
+          </a:p>
+          <a:p>
+            <a:r>
+              <a:rPr lang="en-US"/>
+              <a:t>https://dbup.readthedocs.io/en/latest/</a:t>
+            </a:r>
+            <a:endParaRPr lang="en-US" dirty="0"/>
+          </a:p>
+          <a:p>
+            <a:pPr marL="285750" indent="-285750">
+              <a:buFont typeface="Arial" panose="020B0604020202020204" pitchFamily="34" charset="0"/>
+              <a:buChar char="•"/>
+            </a:pPr>
+            <a:r>
+              <a:rPr lang="en-US" dirty="0" err="1"/>
+              <a:t>DbUp</a:t>
+            </a:r>
+            <a:r>
+              <a:rPr lang="en-US" dirty="0"/>
+              <a:t> is a .NET library that helps you to deploy changes to SQL Server databases. It tracks which SQL scripts have been </a:t>
+            </a:r>
+          </a:p>
+          <a:p>
+            <a:r>
+              <a:rPr lang="en-US" dirty="0"/>
+              <a:t>     run already and runs the change scripts that are needed to get your database up to date.</a:t>
+            </a:r>
+          </a:p>
+        </p:txBody>
+      </p:sp>
+    </p:spTree>
+    <p:extLst>
+      <p:ext uri="{BB962C8B-B14F-4D97-AF65-F5344CB8AC3E}">
+        <p14:creationId xmlns:p14="http://schemas.microsoft.com/office/powerpoint/2010/main" val="4290896405"/>
+      </p:ext>
+    </p:extLst>
+  </p:cSld>
+  <p:clrMapOvr>
+    <a:masterClrMapping/>
+  </p:clrMapOvr>
+</p:sld>
+</file>
+
+<file path=ppt/slides/slide22.xml><?xml version="1.0" encoding="utf-8"?>
 <p:sld xmlns:a="http://schemas.openxmlformats.org/drawingml/2006/main" xmlns:r="http://schemas.openxmlformats.org/officeDocument/2006/relationships" xmlns:p="http://schemas.openxmlformats.org/presentationml/2006/main">
   <p:cSld>
     <p:spTree>

</xml_diff>

<commit_message>
Logging Filter for Grains.
</commit_message>
<xml_diff>
--- a/Presentation/Microsoft Orleans.pptx
+++ b/Presentation/Microsoft Orleans.pptx
@@ -27,7 +27,8 @@
     <p:sldId id="277" r:id="rId24"/>
     <p:sldId id="279" r:id="rId25"/>
     <p:sldId id="280" r:id="rId26"/>
-    <p:sldId id="278" r:id="rId27"/>
+    <p:sldId id="281" r:id="rId27"/>
+    <p:sldId id="278" r:id="rId28"/>
   </p:sldIdLst>
   <p:sldSz cx="12192000" cy="6858000"/>
   <p:notesSz cx="6858000" cy="9144000"/>
@@ -6642,16 +6643,80 @@
           <a:p>
             <a:r>
               <a:rPr lang="en-US" dirty="0"/>
-              <a:t>Orleans DASHBOARD (Internal </a:t>
-            </a:r>
-            <a:r>
-              <a:rPr lang="en-US"/>
-              <a:t>monitoring tool)</a:t>
-            </a:r>
-            <a:endParaRPr lang="en-US" dirty="0"/>
-          </a:p>
-        </p:txBody>
-      </p:sp>
+              <a:t>Orleans DASHBOARD (Internal monitoring tool)</a:t>
+            </a:r>
+          </a:p>
+        </p:txBody>
+      </p:sp>
+      <p:sp>
+        <p:nvSpPr>
+          <p:cNvPr id="5" name="TextBox 4">
+            <a:extLst>
+              <a:ext uri="{FF2B5EF4-FFF2-40B4-BE49-F238E27FC236}">
+                <a16:creationId xmlns:a16="http://schemas.microsoft.com/office/drawing/2014/main" id="{A61653A2-7749-453F-B208-634D5C5AF96D}"/>
+              </a:ext>
+            </a:extLst>
+          </p:cNvPr>
+          <p:cNvSpPr txBox="1"/>
+          <p:nvPr/>
+        </p:nvSpPr>
+        <p:spPr>
+          <a:xfrm>
+            <a:off x="234891" y="1208015"/>
+            <a:ext cx="5443157" cy="369332"/>
+          </a:xfrm>
+          <a:prstGeom prst="rect">
+            <a:avLst/>
+          </a:prstGeom>
+          <a:noFill/>
+        </p:spPr>
+        <p:txBody>
+          <a:bodyPr wrap="none" rtlCol="0">
+            <a:spAutoFit/>
+          </a:bodyPr>
+          <a:lstStyle/>
+          <a:p>
+            <a:pPr marL="285750" indent="-285750">
+              <a:buFont typeface="Arial" panose="020B0604020202020204" pitchFamily="34" charset="0"/>
+              <a:buChar char="•"/>
+            </a:pPr>
+            <a:r>
+              <a:rPr lang="en-US" dirty="0"/>
+              <a:t>It is simple and give us serious insight into Orleans.</a:t>
+            </a:r>
+          </a:p>
+        </p:txBody>
+      </p:sp>
+      <p:pic>
+        <p:nvPicPr>
+          <p:cNvPr id="6" name="Picture 5">
+            <a:extLst>
+              <a:ext uri="{FF2B5EF4-FFF2-40B4-BE49-F238E27FC236}">
+                <a16:creationId xmlns:a16="http://schemas.microsoft.com/office/drawing/2014/main" id="{0AA7DA2D-ACB1-4BFE-9E2B-17970F43C796}"/>
+              </a:ext>
+            </a:extLst>
+          </p:cNvPr>
+          <p:cNvPicPr>
+            <a:picLocks noChangeAspect="1"/>
+          </p:cNvPicPr>
+          <p:nvPr/>
+        </p:nvPicPr>
+        <p:blipFill>
+          <a:blip r:embed="rId2"/>
+          <a:stretch>
+            <a:fillRect/>
+          </a:stretch>
+        </p:blipFill>
+        <p:spPr>
+          <a:xfrm>
+            <a:off x="0" y="1713874"/>
+            <a:ext cx="12192000" cy="4852962"/>
+          </a:xfrm>
+          <a:prstGeom prst="rect">
+            <a:avLst/>
+          </a:prstGeom>
+        </p:spPr>
+      </p:pic>
     </p:spTree>
     <p:extLst>
       <p:ext uri="{BB962C8B-B14F-4D97-AF65-F5344CB8AC3E}">
@@ -6666,6 +6731,136 @@
 </file>
 
 <file path=ppt/slides/slide23.xml><?xml version="1.0" encoding="utf-8"?>
+<p:sld xmlns:a="http://schemas.openxmlformats.org/drawingml/2006/main" xmlns:r="http://schemas.openxmlformats.org/officeDocument/2006/relationships" xmlns:p="http://schemas.openxmlformats.org/presentationml/2006/main">
+  <p:cSld>
+    <p:spTree>
+      <p:nvGrpSpPr>
+        <p:cNvPr id="1" name=""/>
+        <p:cNvGrpSpPr/>
+        <p:nvPr/>
+      </p:nvGrpSpPr>
+      <p:grpSpPr>
+        <a:xfrm>
+          <a:off x="0" y="0"/>
+          <a:ext cx="0" cy="0"/>
+          <a:chOff x="0" y="0"/>
+          <a:chExt cx="0" cy="0"/>
+        </a:xfrm>
+      </p:grpSpPr>
+      <p:sp>
+        <p:nvSpPr>
+          <p:cNvPr id="2" name="Title 1">
+            <a:extLst>
+              <a:ext uri="{FF2B5EF4-FFF2-40B4-BE49-F238E27FC236}">
+                <a16:creationId xmlns:a16="http://schemas.microsoft.com/office/drawing/2014/main" id="{8B99EFF3-C91D-48B0-8F67-0762AC8AAA8F}"/>
+              </a:ext>
+            </a:extLst>
+          </p:cNvPr>
+          <p:cNvSpPr>
+            <a:spLocks noGrp="1"/>
+          </p:cNvSpPr>
+          <p:nvPr>
+            <p:ph type="title"/>
+          </p:nvPr>
+        </p:nvSpPr>
+        <p:spPr>
+          <a:xfrm>
+            <a:off x="581192" y="702156"/>
+            <a:ext cx="11029616" cy="464171"/>
+          </a:xfrm>
+        </p:spPr>
+        <p:txBody>
+          <a:bodyPr>
+            <a:normAutofit fontScale="90000"/>
+          </a:bodyPr>
+          <a:lstStyle/>
+          <a:p>
+            <a:r>
+              <a:rPr lang="en-US" dirty="0"/>
+              <a:t>Grain call filters</a:t>
+            </a:r>
+          </a:p>
+        </p:txBody>
+      </p:sp>
+      <p:sp>
+        <p:nvSpPr>
+          <p:cNvPr id="5" name="TextBox 4">
+            <a:extLst>
+              <a:ext uri="{FF2B5EF4-FFF2-40B4-BE49-F238E27FC236}">
+                <a16:creationId xmlns:a16="http://schemas.microsoft.com/office/drawing/2014/main" id="{27D00EE3-6EBE-44BF-85FE-7C69AFA07727}"/>
+              </a:ext>
+            </a:extLst>
+          </p:cNvPr>
+          <p:cNvSpPr txBox="1"/>
+          <p:nvPr/>
+        </p:nvSpPr>
+        <p:spPr>
+          <a:xfrm>
+            <a:off x="302003" y="1166327"/>
+            <a:ext cx="11746998" cy="1200329"/>
+          </a:xfrm>
+          <a:prstGeom prst="rect">
+            <a:avLst/>
+          </a:prstGeom>
+          <a:noFill/>
+        </p:spPr>
+        <p:txBody>
+          <a:bodyPr wrap="none" rtlCol="0">
+            <a:spAutoFit/>
+          </a:bodyPr>
+          <a:lstStyle/>
+          <a:p>
+            <a:pPr marL="285750" indent="-285750">
+              <a:buFont typeface="Arial" panose="020B0604020202020204" pitchFamily="34" charset="0"/>
+              <a:buChar char="•"/>
+            </a:pPr>
+            <a:r>
+              <a:rPr lang="en-US" dirty="0"/>
+              <a:t>Grain call filters provide a means for intercepting grain calls.</a:t>
+            </a:r>
+          </a:p>
+          <a:p>
+            <a:pPr marL="285750" indent="-285750">
+              <a:buFont typeface="Arial" panose="020B0604020202020204" pitchFamily="34" charset="0"/>
+              <a:buChar char="•"/>
+            </a:pPr>
+            <a:r>
+              <a:rPr lang="en-US" dirty="0"/>
+              <a:t>Filters are coming in two flavors : Incoming call filters &amp; Outgoing call filters.</a:t>
+            </a:r>
+          </a:p>
+          <a:p>
+            <a:pPr marL="285750" indent="-285750">
+              <a:buFont typeface="Arial" panose="020B0604020202020204" pitchFamily="34" charset="0"/>
+              <a:buChar char="•"/>
+            </a:pPr>
+            <a:r>
+              <a:rPr lang="en-US" dirty="0"/>
+              <a:t>They can be used in many scenarios such as authorization Filter can inspect method being invoked and decide if the</a:t>
+            </a:r>
+          </a:p>
+          <a:p>
+            <a:r>
+              <a:rPr lang="en-US" dirty="0"/>
+              <a:t>     user can proceed with the call, login can log a piece of information about method and of course error handling.</a:t>
+            </a:r>
+          </a:p>
+        </p:txBody>
+      </p:sp>
+    </p:spTree>
+    <p:extLst>
+      <p:ext uri="{BB962C8B-B14F-4D97-AF65-F5344CB8AC3E}">
+        <p14:creationId xmlns:p14="http://schemas.microsoft.com/office/powerpoint/2010/main" val="1498372346"/>
+      </p:ext>
+    </p:extLst>
+  </p:cSld>
+  <p:clrMapOvr>
+    <a:masterClrMapping/>
+  </p:clrMapOvr>
+</p:sld>
+</file>
+
+<file path=ppt/slides/slide24.xml><?xml version="1.0" encoding="utf-8"?>
 <p:sld xmlns:a="http://schemas.openxmlformats.org/drawingml/2006/main" xmlns:r="http://schemas.openxmlformats.org/officeDocument/2006/relationships" xmlns:p="http://schemas.openxmlformats.org/presentationml/2006/main">
   <p:cSld>
     <p:spTree>

</xml_diff>

<commit_message>
Event Sourcing for Orleans
</commit_message>
<xml_diff>
--- a/Presentation/Microsoft Orleans.pptx
+++ b/Presentation/Microsoft Orleans.pptx
@@ -30,6 +30,8 @@
     <p:sldId id="280" r:id="rId27"/>
     <p:sldId id="281" r:id="rId28"/>
     <p:sldId id="282" r:id="rId29"/>
+    <p:sldId id="283" r:id="rId30"/>
+    <p:sldId id="284" r:id="rId31"/>
   </p:sldIdLst>
   <p:sldSz cx="12192000" cy="6858000"/>
   <p:notesSz cx="6858000" cy="9144000"/>
@@ -374,7 +376,7 @@
           <a:p>
             <a:fld id="{ED291B17-9318-49DB-B28B-6E5994AE9581}" type="datetime1">
               <a:rPr lang="en-US" smtClean="0"/>
-              <a:t>1/17/2021</a:t>
+              <a:t>1/19/2021</a:t>
             </a:fld>
             <a:endParaRPr lang="en-US" dirty="0"/>
           </a:p>
@@ -577,7 +579,7 @@
           <a:p>
             <a:fld id="{2CED4963-E985-44C4-B8C4-FDD613B7C2F8}" type="datetime1">
               <a:rPr lang="en-US" smtClean="0"/>
-              <a:t>1/17/2021</a:t>
+              <a:t>1/19/2021</a:t>
             </a:fld>
             <a:endParaRPr lang="en-US" dirty="0"/>
           </a:p>
@@ -939,7 +941,7 @@
           <a:p>
             <a:fld id="{ED291B17-9318-49DB-B28B-6E5994AE9581}" type="datetime1">
               <a:rPr lang="en-US" smtClean="0"/>
-              <a:t>1/17/2021</a:t>
+              <a:t>1/19/2021</a:t>
             </a:fld>
             <a:endParaRPr lang="en-US" dirty="0"/>
           </a:p>
@@ -1137,7 +1139,7 @@
           <a:p>
             <a:fld id="{78DD82B9-B8EE-4375-B6FF-88FA6ABB15D9}" type="datetime1">
               <a:rPr lang="en-US" smtClean="0"/>
-              <a:t>1/17/2021</a:t>
+              <a:t>1/19/2021</a:t>
             </a:fld>
             <a:endParaRPr lang="en-US" dirty="0"/>
           </a:p>
@@ -1449,7 +1451,7 @@
           <a:p>
             <a:fld id="{B2497495-0637-405E-AE64-5CC7506D51F5}" type="datetime1">
               <a:rPr lang="en-US" smtClean="0"/>
-              <a:t>1/17/2021</a:t>
+              <a:t>1/19/2021</a:t>
             </a:fld>
             <a:endParaRPr lang="en-US" dirty="0"/>
           </a:p>
@@ -1702,7 +1704,7 @@
           <a:p>
             <a:fld id="{7BFFD690-9426-415D-8B65-26881E07B2D4}" type="datetime1">
               <a:rPr lang="en-US" smtClean="0"/>
-              <a:t>1/17/2021</a:t>
+              <a:t>1/19/2021</a:t>
             </a:fld>
             <a:endParaRPr lang="en-US" dirty="0"/>
           </a:p>
@@ -2124,7 +2126,7 @@
           <a:p>
             <a:fld id="{04C4989A-474C-40DE-95B9-011C28B71673}" type="datetime1">
               <a:rPr lang="en-US" smtClean="0"/>
-              <a:t>1/17/2021</a:t>
+              <a:t>1/19/2021</a:t>
             </a:fld>
             <a:endParaRPr lang="en-US" dirty="0"/>
           </a:p>
@@ -2247,7 +2249,7 @@
           <a:p>
             <a:fld id="{5DB4ED54-5B5E-4A04-93D3-5772E3CE3818}" type="datetime1">
               <a:rPr lang="en-US" smtClean="0"/>
-              <a:t>1/17/2021</a:t>
+              <a:t>1/19/2021</a:t>
             </a:fld>
             <a:endParaRPr lang="en-US" dirty="0"/>
           </a:p>
@@ -2342,7 +2344,7 @@
           <a:p>
             <a:fld id="{4EDE50D6-574B-40AF-946F-D52A04ADE379}" type="datetime1">
               <a:rPr lang="en-US" smtClean="0"/>
-              <a:t>1/17/2021</a:t>
+              <a:t>1/19/2021</a:t>
             </a:fld>
             <a:endParaRPr lang="en-US" dirty="0"/>
           </a:p>
@@ -2719,7 +2721,7 @@
           <a:p>
             <a:fld id="{D82884F1-FFEA-405F-9602-3DCA865EDA4E}" type="datetime1">
               <a:rPr lang="en-US" smtClean="0"/>
-              <a:t>1/17/2021</a:t>
+              <a:t>1/19/2021</a:t>
             </a:fld>
             <a:endParaRPr lang="en-US" dirty="0"/>
           </a:p>
@@ -3012,7 +3014,7 @@
           <a:p>
             <a:fld id="{7E18DB4A-8810-4A10-AD5C-D5E2C667F5B3}" type="datetime1">
               <a:rPr lang="en-US" smtClean="0"/>
-              <a:t>1/17/2021</a:t>
+              <a:t>1/19/2021</a:t>
             </a:fld>
             <a:endParaRPr lang="en-US" dirty="0"/>
           </a:p>
@@ -3227,7 +3229,7 @@
           <a:p>
             <a:fld id="{ED291B17-9318-49DB-B28B-6E5994AE9581}" type="datetime1">
               <a:rPr lang="en-US" smtClean="0"/>
-              <a:t>1/17/2021</a:t>
+              <a:t>1/19/2021</a:t>
             </a:fld>
             <a:endParaRPr lang="en-US" dirty="0"/>
           </a:p>
@@ -6989,7 +6991,7 @@
         </p:nvSpPr>
         <p:spPr>
           <a:xfrm>
-            <a:off x="581192" y="702156"/>
+            <a:off x="581192" y="593099"/>
             <a:ext cx="11029616" cy="413580"/>
           </a:xfrm>
         </p:spPr>
@@ -7039,12 +7041,8 @@
               <a:buChar char="•"/>
             </a:pPr>
             <a:r>
-              <a:rPr lang="en-US" dirty="0" err="1"/>
-              <a:t>RequestContext</a:t>
-            </a:r>
-            <a:r>
-              <a:rPr lang="en-US" dirty="0"/>
-              <a:t> is an Orleans feature that allows application metadata, such as trace ID or whatever we need to pass, to </a:t>
+              <a:rPr lang="en-US" dirty="0"/>
+              <a:t>Request Context is an Orleans feature that allows application metadata, such as trace ID or whatever we need to pass, to </a:t>
             </a:r>
           </a:p>
           <a:p>
@@ -7067,6 +7065,351 @@
     <p:extLst>
       <p:ext uri="{BB962C8B-B14F-4D97-AF65-F5344CB8AC3E}">
         <p14:creationId xmlns:p14="http://schemas.microsoft.com/office/powerpoint/2010/main" val="3699499948"/>
+      </p:ext>
+    </p:extLst>
+  </p:cSld>
+  <p:clrMapOvr>
+    <a:masterClrMapping/>
+  </p:clrMapOvr>
+</p:sld>
+</file>
+
+<file path=ppt/slides/slide26.xml><?xml version="1.0" encoding="utf-8"?>
+<p:sld xmlns:a="http://schemas.openxmlformats.org/drawingml/2006/main" xmlns:r="http://schemas.openxmlformats.org/officeDocument/2006/relationships" xmlns:p="http://schemas.openxmlformats.org/presentationml/2006/main">
+  <p:cSld>
+    <p:spTree>
+      <p:nvGrpSpPr>
+        <p:cNvPr id="1" name=""/>
+        <p:cNvGrpSpPr/>
+        <p:nvPr/>
+      </p:nvGrpSpPr>
+      <p:grpSpPr>
+        <a:xfrm>
+          <a:off x="0" y="0"/>
+          <a:ext cx="0" cy="0"/>
+          <a:chOff x="0" y="0"/>
+          <a:chExt cx="0" cy="0"/>
+        </a:xfrm>
+      </p:grpSpPr>
+      <p:sp>
+        <p:nvSpPr>
+          <p:cNvPr id="2" name="Title 1">
+            <a:extLst>
+              <a:ext uri="{FF2B5EF4-FFF2-40B4-BE49-F238E27FC236}">
+                <a16:creationId xmlns:a16="http://schemas.microsoft.com/office/drawing/2014/main" id="{99AA1110-AC3E-4D4D-AE5E-37C0FC7B1CAA}"/>
+              </a:ext>
+            </a:extLst>
+          </p:cNvPr>
+          <p:cNvSpPr>
+            <a:spLocks noGrp="1"/>
+          </p:cNvSpPr>
+          <p:nvPr>
+            <p:ph type="title"/>
+          </p:nvPr>
+        </p:nvSpPr>
+        <p:spPr>
+          <a:xfrm>
+            <a:off x="581192" y="593099"/>
+            <a:ext cx="11029616" cy="438747"/>
+          </a:xfrm>
+        </p:spPr>
+        <p:txBody>
+          <a:bodyPr>
+            <a:normAutofit fontScale="90000"/>
+          </a:bodyPr>
+          <a:lstStyle/>
+          <a:p>
+            <a:r>
+              <a:rPr lang="en-US" dirty="0"/>
+              <a:t>Event Sourcing</a:t>
+            </a:r>
+          </a:p>
+        </p:txBody>
+      </p:sp>
+      <p:sp>
+        <p:nvSpPr>
+          <p:cNvPr id="4" name="TextBox 3">
+            <a:extLst>
+              <a:ext uri="{FF2B5EF4-FFF2-40B4-BE49-F238E27FC236}">
+                <a16:creationId xmlns:a16="http://schemas.microsoft.com/office/drawing/2014/main" id="{39B55EE5-0DB9-4E14-8591-9AF78032E34C}"/>
+              </a:ext>
+            </a:extLst>
+          </p:cNvPr>
+          <p:cNvSpPr txBox="1"/>
+          <p:nvPr/>
+        </p:nvSpPr>
+        <p:spPr>
+          <a:xfrm>
+            <a:off x="0" y="964734"/>
+            <a:ext cx="12377363" cy="2585323"/>
+          </a:xfrm>
+          <a:prstGeom prst="rect">
+            <a:avLst/>
+          </a:prstGeom>
+          <a:noFill/>
+        </p:spPr>
+        <p:txBody>
+          <a:bodyPr wrap="none" rtlCol="0">
+            <a:spAutoFit/>
+          </a:bodyPr>
+          <a:lstStyle/>
+          <a:p>
+            <a:pPr marL="285750" indent="-285750">
+              <a:buFont typeface="Arial" panose="020B0604020202020204" pitchFamily="34" charset="0"/>
+              <a:buChar char="•"/>
+            </a:pPr>
+            <a:r>
+              <a:rPr lang="en-US" dirty="0"/>
+              <a:t>Event sourcing ensures that all changes to the application state are stored as a sequence of events. Not just query these </a:t>
+            </a:r>
+          </a:p>
+          <a:p>
+            <a:r>
+              <a:rPr lang="en-US" dirty="0"/>
+              <a:t>     events or even walk to construct the past states.</a:t>
+            </a:r>
+          </a:p>
+          <a:p>
+            <a:pPr marL="285750" indent="-285750">
+              <a:buFont typeface="Arial" panose="020B0604020202020204" pitchFamily="34" charset="0"/>
+              <a:buChar char="•"/>
+            </a:pPr>
+            <a:r>
+              <a:rPr lang="en-US" dirty="0"/>
+              <a:t>The fundamental idea of event sourcing is that ensuring every change to the state of an application is captured in an event</a:t>
+            </a:r>
+          </a:p>
+          <a:p>
+            <a:r>
+              <a:rPr lang="en-US" dirty="0"/>
+              <a:t>      object. This event object is stored in sequence that we applied for the same lifetime as the application state itself.</a:t>
+            </a:r>
+          </a:p>
+          <a:p>
+            <a:pPr marL="285750" indent="-285750">
+              <a:buFont typeface="Arial" panose="020B0604020202020204" pitchFamily="34" charset="0"/>
+              <a:buChar char="•"/>
+            </a:pPr>
+            <a:r>
+              <a:rPr lang="en-US" dirty="0"/>
+              <a:t>The most important thing in event source is that we have a log of all changes. Not just that we can see order of events and </a:t>
+            </a:r>
+          </a:p>
+          <a:p>
+            <a:r>
+              <a:rPr lang="en-US" dirty="0"/>
+              <a:t>     write to a log file whenever event occurs.</a:t>
+            </a:r>
+          </a:p>
+          <a:p>
+            <a:pPr marL="285750" indent="-285750">
+              <a:buFont typeface="Arial" panose="020B0604020202020204" pitchFamily="34" charset="0"/>
+              <a:buChar char="•"/>
+            </a:pPr>
+            <a:r>
+              <a:rPr lang="en-US" dirty="0"/>
+              <a:t>In this client posting Greeting events to the Grain. Each of these Greeting event holds Greeting and </a:t>
+            </a:r>
+            <a:r>
+              <a:rPr lang="en-US" dirty="0" err="1"/>
+              <a:t>TimeStamp.We</a:t>
+            </a:r>
+            <a:r>
+              <a:rPr lang="en-US" dirty="0"/>
+              <a:t> know </a:t>
+            </a:r>
+          </a:p>
+          <a:p>
+            <a:r>
+              <a:rPr lang="en-US" dirty="0"/>
+              <a:t>     that event reached the Grain. Any time, the object reaches the GRAIN then it will be stored in </a:t>
+            </a:r>
+            <a:r>
+              <a:rPr lang="en-US" dirty="0" err="1"/>
+              <a:t>EventStore</a:t>
+            </a:r>
+            <a:r>
+              <a:rPr lang="en-US" dirty="0"/>
+              <a:t> for that method.</a:t>
+            </a:r>
+          </a:p>
+          <a:p>
+            <a:r>
+              <a:rPr lang="en-US" dirty="0"/>
+              <a:t>     It will give an ordered event object.</a:t>
+            </a:r>
+          </a:p>
+        </p:txBody>
+      </p:sp>
+      <p:pic>
+        <p:nvPicPr>
+          <p:cNvPr id="5" name="Picture 4">
+            <a:extLst>
+              <a:ext uri="{FF2B5EF4-FFF2-40B4-BE49-F238E27FC236}">
+                <a16:creationId xmlns:a16="http://schemas.microsoft.com/office/drawing/2014/main" id="{B9788801-19FC-4DC7-96FA-5998CBD0D116}"/>
+              </a:ext>
+            </a:extLst>
+          </p:cNvPr>
+          <p:cNvPicPr>
+            <a:picLocks noChangeAspect="1"/>
+          </p:cNvPicPr>
+          <p:nvPr/>
+        </p:nvPicPr>
+        <p:blipFill>
+          <a:blip r:embed="rId2"/>
+          <a:stretch>
+            <a:fillRect/>
+          </a:stretch>
+        </p:blipFill>
+        <p:spPr>
+          <a:xfrm>
+            <a:off x="0" y="3514986"/>
+            <a:ext cx="10610850" cy="3343013"/>
+          </a:xfrm>
+          <a:prstGeom prst="rect">
+            <a:avLst/>
+          </a:prstGeom>
+        </p:spPr>
+      </p:pic>
+    </p:spTree>
+    <p:extLst>
+      <p:ext uri="{BB962C8B-B14F-4D97-AF65-F5344CB8AC3E}">
+        <p14:creationId xmlns:p14="http://schemas.microsoft.com/office/powerpoint/2010/main" val="82145031"/>
+      </p:ext>
+    </p:extLst>
+  </p:cSld>
+  <p:clrMapOvr>
+    <a:masterClrMapping/>
+  </p:clrMapOvr>
+</p:sld>
+</file>
+
+<file path=ppt/slides/slide27.xml><?xml version="1.0" encoding="utf-8"?>
+<p:sld xmlns:a="http://schemas.openxmlformats.org/drawingml/2006/main" xmlns:r="http://schemas.openxmlformats.org/officeDocument/2006/relationships" xmlns:p="http://schemas.openxmlformats.org/presentationml/2006/main">
+  <p:cSld>
+    <p:spTree>
+      <p:nvGrpSpPr>
+        <p:cNvPr id="1" name=""/>
+        <p:cNvGrpSpPr/>
+        <p:nvPr/>
+      </p:nvGrpSpPr>
+      <p:grpSpPr>
+        <a:xfrm>
+          <a:off x="0" y="0"/>
+          <a:ext cx="0" cy="0"/>
+          <a:chOff x="0" y="0"/>
+          <a:chExt cx="0" cy="0"/>
+        </a:xfrm>
+      </p:grpSpPr>
+      <p:sp>
+        <p:nvSpPr>
+          <p:cNvPr id="2" name="Title 1">
+            <a:extLst>
+              <a:ext uri="{FF2B5EF4-FFF2-40B4-BE49-F238E27FC236}">
+                <a16:creationId xmlns:a16="http://schemas.microsoft.com/office/drawing/2014/main" id="{312C096B-4417-4509-944B-BBB208007FC7}"/>
+              </a:ext>
+            </a:extLst>
+          </p:cNvPr>
+          <p:cNvSpPr>
+            <a:spLocks noGrp="1"/>
+          </p:cNvSpPr>
+          <p:nvPr>
+            <p:ph type="title"/>
+          </p:nvPr>
+        </p:nvSpPr>
+        <p:spPr>
+          <a:xfrm>
+            <a:off x="581191" y="576321"/>
+            <a:ext cx="11029616" cy="430358"/>
+          </a:xfrm>
+        </p:spPr>
+        <p:txBody>
+          <a:bodyPr>
+            <a:normAutofit fontScale="90000"/>
+          </a:bodyPr>
+          <a:lstStyle/>
+          <a:p>
+            <a:r>
+              <a:rPr lang="en-US" dirty="0"/>
+              <a:t>JOURNALED GRAIN</a:t>
+            </a:r>
+          </a:p>
+        </p:txBody>
+      </p:sp>
+      <p:sp>
+        <p:nvSpPr>
+          <p:cNvPr id="4" name="TextBox 3">
+            <a:extLst>
+              <a:ext uri="{FF2B5EF4-FFF2-40B4-BE49-F238E27FC236}">
+                <a16:creationId xmlns:a16="http://schemas.microsoft.com/office/drawing/2014/main" id="{0ACBAF2D-81CE-43D3-ACCA-8F5A3D7DCE11}"/>
+              </a:ext>
+            </a:extLst>
+          </p:cNvPr>
+          <p:cNvSpPr txBox="1"/>
+          <p:nvPr/>
+        </p:nvSpPr>
+        <p:spPr>
+          <a:xfrm>
+            <a:off x="142614" y="1006679"/>
+            <a:ext cx="12005146" cy="1754326"/>
+          </a:xfrm>
+          <a:prstGeom prst="rect">
+            <a:avLst/>
+          </a:prstGeom>
+          <a:noFill/>
+        </p:spPr>
+        <p:txBody>
+          <a:bodyPr wrap="none" rtlCol="0">
+            <a:spAutoFit/>
+          </a:bodyPr>
+          <a:lstStyle/>
+          <a:p>
+            <a:pPr marL="285750" indent="-285750">
+              <a:buFont typeface="Arial" panose="020B0604020202020204" pitchFamily="34" charset="0"/>
+              <a:buChar char="•"/>
+            </a:pPr>
+            <a:r>
+              <a:rPr lang="en-US" dirty="0"/>
+              <a:t>Imagine Event Sourcing is a stream of events. There is a possibility to touch each of the events or reply to the whole set</a:t>
+            </a:r>
+          </a:p>
+          <a:p>
+            <a:r>
+              <a:rPr lang="en-US" dirty="0"/>
+              <a:t>     of events which already happened. </a:t>
+            </a:r>
+          </a:p>
+          <a:p>
+            <a:pPr marL="285750" indent="-285750">
+              <a:buFont typeface="Arial" panose="020B0604020202020204" pitchFamily="34" charset="0"/>
+              <a:buChar char="•"/>
+            </a:pPr>
+            <a:r>
+              <a:rPr lang="en-US" dirty="0"/>
+              <a:t>This gives us great flexibility in programming where exactly knows what happened and when happened. Useful for </a:t>
+            </a:r>
+          </a:p>
+          <a:p>
+            <a:r>
+              <a:rPr lang="en-US" dirty="0"/>
+              <a:t>     debugging. In this case, we are going to implement saving of latest event. We are going to store it in the table of </a:t>
+            </a:r>
+          </a:p>
+          <a:p>
+            <a:r>
+              <a:rPr lang="en-US" dirty="0"/>
+              <a:t>     relational database.</a:t>
+            </a:r>
+          </a:p>
+          <a:p>
+            <a:endParaRPr lang="en-US" dirty="0"/>
+          </a:p>
+        </p:txBody>
+      </p:sp>
+    </p:spTree>
+    <p:extLst>
+      <p:ext uri="{BB962C8B-B14F-4D97-AF65-F5344CB8AC3E}">
+        <p14:creationId xmlns:p14="http://schemas.microsoft.com/office/powerpoint/2010/main" val="370120084"/>
       </p:ext>
     </p:extLst>
   </p:cSld>

</xml_diff>

<commit_message>
Graceful shutdown of Silo.
</commit_message>
<xml_diff>
--- a/Presentation/Microsoft Orleans.pptx
+++ b/Presentation/Microsoft Orleans.pptx
@@ -32,6 +32,8 @@
     <p:sldId id="282" r:id="rId29"/>
     <p:sldId id="283" r:id="rId30"/>
     <p:sldId id="284" r:id="rId31"/>
+    <p:sldId id="285" r:id="rId32"/>
+    <p:sldId id="286" r:id="rId33"/>
   </p:sldIdLst>
   <p:sldSz cx="12192000" cy="6858000"/>
   <p:notesSz cx="6858000" cy="9144000"/>
@@ -7419,6 +7421,256 @@
 </p:sld>
 </file>
 
+<file path=ppt/slides/slide28.xml><?xml version="1.0" encoding="utf-8"?>
+<p:sld xmlns:a="http://schemas.openxmlformats.org/drawingml/2006/main" xmlns:r="http://schemas.openxmlformats.org/officeDocument/2006/relationships" xmlns:p="http://schemas.openxmlformats.org/presentationml/2006/main">
+  <p:cSld>
+    <p:spTree>
+      <p:nvGrpSpPr>
+        <p:cNvPr id="1" name=""/>
+        <p:cNvGrpSpPr/>
+        <p:nvPr/>
+      </p:nvGrpSpPr>
+      <p:grpSpPr>
+        <a:xfrm>
+          <a:off x="0" y="0"/>
+          <a:ext cx="0" cy="0"/>
+          <a:chOff x="0" y="0"/>
+          <a:chExt cx="0" cy="0"/>
+        </a:xfrm>
+      </p:grpSpPr>
+      <p:sp>
+        <p:nvSpPr>
+          <p:cNvPr id="2" name="Title 1">
+            <a:extLst>
+              <a:ext uri="{FF2B5EF4-FFF2-40B4-BE49-F238E27FC236}">
+                <a16:creationId xmlns:a16="http://schemas.microsoft.com/office/drawing/2014/main" id="{903B2C9A-F8B7-48B5-A6E1-31A217A5BD19}"/>
+              </a:ext>
+            </a:extLst>
+          </p:cNvPr>
+          <p:cNvSpPr>
+            <a:spLocks noGrp="1"/>
+          </p:cNvSpPr>
+          <p:nvPr>
+            <p:ph type="title"/>
+          </p:nvPr>
+        </p:nvSpPr>
+        <p:spPr>
+          <a:xfrm>
+            <a:off x="581192" y="702156"/>
+            <a:ext cx="11029616" cy="438747"/>
+          </a:xfrm>
+        </p:spPr>
+        <p:txBody>
+          <a:bodyPr>
+            <a:normAutofit fontScale="90000"/>
+          </a:bodyPr>
+          <a:lstStyle/>
+          <a:p>
+            <a:r>
+              <a:rPr lang="en-US" dirty="0"/>
+              <a:t>EVENT STORE</a:t>
+            </a:r>
+          </a:p>
+        </p:txBody>
+      </p:sp>
+      <p:sp>
+        <p:nvSpPr>
+          <p:cNvPr id="4" name="TextBox 3">
+            <a:extLst>
+              <a:ext uri="{FF2B5EF4-FFF2-40B4-BE49-F238E27FC236}">
+                <a16:creationId xmlns:a16="http://schemas.microsoft.com/office/drawing/2014/main" id="{1DEFCF70-25F7-4662-8132-E317329F3DCE}"/>
+              </a:ext>
+            </a:extLst>
+          </p:cNvPr>
+          <p:cNvSpPr txBox="1"/>
+          <p:nvPr/>
+        </p:nvSpPr>
+        <p:spPr>
+          <a:xfrm>
+            <a:off x="0" y="1140903"/>
+            <a:ext cx="12078371" cy="1200329"/>
+          </a:xfrm>
+          <a:prstGeom prst="rect">
+            <a:avLst/>
+          </a:prstGeom>
+          <a:noFill/>
+        </p:spPr>
+        <p:txBody>
+          <a:bodyPr wrap="none" rtlCol="0">
+            <a:spAutoFit/>
+          </a:bodyPr>
+          <a:lstStyle/>
+          <a:p>
+            <a:pPr marL="285750" indent="-285750">
+              <a:buFont typeface="Arial" panose="020B0604020202020204" pitchFamily="34" charset="0"/>
+              <a:buChar char="•"/>
+            </a:pPr>
+            <a:r>
+              <a:rPr lang="en-US" dirty="0"/>
+              <a:t>Event Store is a stream database which stores data as immutable series of events and directly supports event sourcing.</a:t>
+            </a:r>
+          </a:p>
+          <a:p>
+            <a:endParaRPr lang="en-US" dirty="0"/>
+          </a:p>
+          <a:p>
+            <a:r>
+              <a:rPr lang="en-US" dirty="0">
+                <a:hlinkClick r:id="rId2"/>
+              </a:rPr>
+              <a:t>https://www.eventstore.com/downloads#releases</a:t>
+            </a:r>
+            <a:endParaRPr lang="en-US" dirty="0"/>
+          </a:p>
+          <a:p>
+            <a:endParaRPr lang="en-US" dirty="0"/>
+          </a:p>
+        </p:txBody>
+      </p:sp>
+    </p:spTree>
+    <p:extLst>
+      <p:ext uri="{BB962C8B-B14F-4D97-AF65-F5344CB8AC3E}">
+        <p14:creationId xmlns:p14="http://schemas.microsoft.com/office/powerpoint/2010/main" val="35931295"/>
+      </p:ext>
+    </p:extLst>
+  </p:cSld>
+  <p:clrMapOvr>
+    <a:masterClrMapping/>
+  </p:clrMapOvr>
+</p:sld>
+</file>
+
+<file path=ppt/slides/slide29.xml><?xml version="1.0" encoding="utf-8"?>
+<p:sld xmlns:a="http://schemas.openxmlformats.org/drawingml/2006/main" xmlns:r="http://schemas.openxmlformats.org/officeDocument/2006/relationships" xmlns:p="http://schemas.openxmlformats.org/presentationml/2006/main">
+  <p:cSld>
+    <p:spTree>
+      <p:nvGrpSpPr>
+        <p:cNvPr id="1" name=""/>
+        <p:cNvGrpSpPr/>
+        <p:nvPr/>
+      </p:nvGrpSpPr>
+      <p:grpSpPr>
+        <a:xfrm>
+          <a:off x="0" y="0"/>
+          <a:ext cx="0" cy="0"/>
+          <a:chOff x="0" y="0"/>
+          <a:chExt cx="0" cy="0"/>
+        </a:xfrm>
+      </p:grpSpPr>
+      <p:sp>
+        <p:nvSpPr>
+          <p:cNvPr id="2" name="Title 1">
+            <a:extLst>
+              <a:ext uri="{FF2B5EF4-FFF2-40B4-BE49-F238E27FC236}">
+                <a16:creationId xmlns:a16="http://schemas.microsoft.com/office/drawing/2014/main" id="{CFCC6035-F4A2-4CB2-9141-0C7D8F99CFA7}"/>
+              </a:ext>
+            </a:extLst>
+          </p:cNvPr>
+          <p:cNvSpPr>
+            <a:spLocks noGrp="1"/>
+          </p:cNvSpPr>
+          <p:nvPr>
+            <p:ph type="title"/>
+          </p:nvPr>
+        </p:nvSpPr>
+        <p:spPr>
+          <a:xfrm>
+            <a:off x="497302" y="668600"/>
+            <a:ext cx="11029616" cy="430358"/>
+          </a:xfrm>
+        </p:spPr>
+        <p:txBody>
+          <a:bodyPr>
+            <a:normAutofit fontScale="90000"/>
+          </a:bodyPr>
+          <a:lstStyle/>
+          <a:p>
+            <a:r>
+              <a:rPr lang="en-US" dirty="0"/>
+              <a:t>Graceful SHUTDOWN of silo</a:t>
+            </a:r>
+          </a:p>
+        </p:txBody>
+      </p:sp>
+      <p:sp>
+        <p:nvSpPr>
+          <p:cNvPr id="5" name="TextBox 4">
+            <a:extLst>
+              <a:ext uri="{FF2B5EF4-FFF2-40B4-BE49-F238E27FC236}">
+                <a16:creationId xmlns:a16="http://schemas.microsoft.com/office/drawing/2014/main" id="{F57E6344-1D2D-41A9-A939-A1F31BA11C7F}"/>
+              </a:ext>
+            </a:extLst>
+          </p:cNvPr>
+          <p:cNvSpPr txBox="1"/>
+          <p:nvPr/>
+        </p:nvSpPr>
+        <p:spPr>
+          <a:xfrm>
+            <a:off x="312571" y="1098958"/>
+            <a:ext cx="11979883" cy="1200329"/>
+          </a:xfrm>
+          <a:prstGeom prst="rect">
+            <a:avLst/>
+          </a:prstGeom>
+          <a:noFill/>
+        </p:spPr>
+        <p:txBody>
+          <a:bodyPr wrap="none" rtlCol="0">
+            <a:spAutoFit/>
+          </a:bodyPr>
+          <a:lstStyle/>
+          <a:p>
+            <a:pPr marL="285750" indent="-285750">
+              <a:buFont typeface="Arial" panose="020B0604020202020204" pitchFamily="34" charset="0"/>
+              <a:buChar char="•"/>
+            </a:pPr>
+            <a:r>
+              <a:rPr lang="en-US" dirty="0"/>
+              <a:t>It is useful for preparation of Clustering. </a:t>
+            </a:r>
+          </a:p>
+          <a:p>
+            <a:pPr marL="285750" indent="-285750">
+              <a:buFont typeface="Arial" panose="020B0604020202020204" pitchFamily="34" charset="0"/>
+              <a:buChar char="•"/>
+            </a:pPr>
+            <a:r>
+              <a:rPr lang="en-US" dirty="0"/>
+              <a:t>When Ctrl + C is pressed, it will generate cancel event. The application will exit immediately causing a catastrophic silo </a:t>
+            </a:r>
+          </a:p>
+          <a:p>
+            <a:r>
+              <a:rPr lang="en-US" dirty="0"/>
+              <a:t>     clash and loss of memory state.</a:t>
+            </a:r>
+          </a:p>
+          <a:p>
+            <a:r>
+              <a:rPr lang="en-US" dirty="0"/>
+              <a:t>With a little of magic, we can prevent application causing before application save state and performs </a:t>
+            </a:r>
+            <a:r>
+              <a:rPr lang="en-US"/>
+              <a:t>graceful shutdown.</a:t>
+            </a:r>
+            <a:endParaRPr lang="en-US" dirty="0"/>
+          </a:p>
+        </p:txBody>
+      </p:sp>
+    </p:spTree>
+    <p:extLst>
+      <p:ext uri="{BB962C8B-B14F-4D97-AF65-F5344CB8AC3E}">
+        <p14:creationId xmlns:p14="http://schemas.microsoft.com/office/powerpoint/2010/main" val="3581958831"/>
+      </p:ext>
+    </p:extLst>
+  </p:cSld>
+  <p:clrMapOvr>
+    <a:masterClrMapping/>
+  </p:clrMapOvr>
+</p:sld>
+</file>
+
 <file path=ppt/slides/slide3.xml><?xml version="1.0" encoding="utf-8"?>
 <p:sld xmlns:a="http://schemas.openxmlformats.org/drawingml/2006/main" xmlns:r="http://schemas.openxmlformats.org/officeDocument/2006/relationships" xmlns:p="http://schemas.openxmlformats.org/presentationml/2006/main">
   <p:cSld>
@@ -8877,6 +9129,24 @@
 </file>
 
 <file path=customXml/item1.xml><?xml version="1.0" encoding="utf-8"?>
+<p:properties xmlns:p="http://schemas.microsoft.com/office/2006/metadata/properties" xmlns:xsi="http://www.w3.org/2001/XMLSchema-instance" xmlns:pc="http://schemas.microsoft.com/office/infopath/2007/PartnerControls">
+  <documentManagement>
+    <Status xmlns="71af3243-3dd4-4a8d-8c0d-dd76da1f02a5">Not started</Status>
+    <MediaServiceKeyPoints xmlns="71af3243-3dd4-4a8d-8c0d-dd76da1f02a5" xsi:nil="true"/>
+  </documentManagement>
+</p:properties>
+</file>
+
+<file path=customXml/item2.xml><?xml version="1.0" encoding="utf-8"?>
+<?mso-contentType ?>
+<FormTemplates xmlns="http://schemas.microsoft.com/sharepoint/v3/contenttype/forms">
+  <Display>DocumentLibraryForm</Display>
+  <Edit>DocumentLibraryForm</Edit>
+  <New>DocumentLibraryForm</New>
+</FormTemplates>
+</file>
+
+<file path=customXml/item3.xml><?xml version="1.0" encoding="utf-8"?>
 <ct:contentTypeSchema xmlns:ct="http://schemas.microsoft.com/office/2006/metadata/contentType" xmlns:ma="http://schemas.microsoft.com/office/2006/metadata/properties/metaAttributes" ct:_="" ma:_="" ma:contentTypeName="Document" ma:contentTypeID="0x01010079F111ED35F8CC479449609E8A0923A6" ma:contentTypeVersion="12" ma:contentTypeDescription="Create a new document." ma:contentTypeScope="" ma:versionID="a410dd7f93c95333ffa1b60ed6adedd1">
   <xsd:schema xmlns:xsd="http://www.w3.org/2001/XMLSchema" xmlns:xs="http://www.w3.org/2001/XMLSchema" xmlns:p="http://schemas.microsoft.com/office/2006/metadata/properties" xmlns:ns2="71af3243-3dd4-4a8d-8c0d-dd76da1f02a5" xmlns:ns3="16c05727-aa75-4e4a-9b5f-8a80a1165891" targetNamespace="http://schemas.microsoft.com/office/2006/metadata/properties" ma:root="true" ma:fieldsID="a936d9baba76aa3866493feff160faab" ns2:_="" ns3:_="">
     <xsd:import namespace="71af3243-3dd4-4a8d-8c0d-dd76da1f02a5"/>
@@ -9097,25 +9367,25 @@
 </ct:contentTypeSchema>
 </file>
 
-<file path=customXml/item2.xml><?xml version="1.0" encoding="utf-8"?>
-<?mso-contentType ?>
-<FormTemplates xmlns="http://schemas.microsoft.com/sharepoint/v3/contenttype/forms">
-  <Display>DocumentLibraryForm</Display>
-  <Edit>DocumentLibraryForm</Edit>
-  <New>DocumentLibraryForm</New>
-</FormTemplates>
+<file path=customXml/itemProps1.xml><?xml version="1.0" encoding="utf-8"?>
+<ds:datastoreItem xmlns:ds="http://schemas.openxmlformats.org/officeDocument/2006/customXml" ds:itemID="{8D289AE2-D2AE-49D1-AFAC-3A79F6794255}">
+  <ds:schemaRefs>
+    <ds:schemaRef ds:uri="http://schemas.microsoft.com/office/2006/metadata/properties"/>
+    <ds:schemaRef ds:uri="http://schemas.microsoft.com/office/infopath/2007/PartnerControls"/>
+    <ds:schemaRef ds:uri="71af3243-3dd4-4a8d-8c0d-dd76da1f02a5"/>
+  </ds:schemaRefs>
+</ds:datastoreItem>
 </file>
 
-<file path=customXml/item3.xml><?xml version="1.0" encoding="utf-8"?>
-<p:properties xmlns:p="http://schemas.microsoft.com/office/2006/metadata/properties" xmlns:xsi="http://www.w3.org/2001/XMLSchema-instance" xmlns:pc="http://schemas.microsoft.com/office/infopath/2007/PartnerControls">
-  <documentManagement>
-    <Status xmlns="71af3243-3dd4-4a8d-8c0d-dd76da1f02a5">Not started</Status>
-    <MediaServiceKeyPoints xmlns="71af3243-3dd4-4a8d-8c0d-dd76da1f02a5" xsi:nil="true"/>
-  </documentManagement>
-</p:properties>
+<file path=customXml/itemProps2.xml><?xml version="1.0" encoding="utf-8"?>
+<ds:datastoreItem xmlns:ds="http://schemas.openxmlformats.org/officeDocument/2006/customXml" ds:itemID="{927BD4C1-B6B1-4715-ABF9-E660A51A4EA0}">
+  <ds:schemaRefs>
+    <ds:schemaRef ds:uri="http://schemas.microsoft.com/sharepoint/v3/contenttype/forms"/>
+  </ds:schemaRefs>
+</ds:datastoreItem>
 </file>
 
-<file path=customXml/itemProps1.xml><?xml version="1.0" encoding="utf-8"?>
+<file path=customXml/itemProps3.xml><?xml version="1.0" encoding="utf-8"?>
 <ds:datastoreItem xmlns:ds="http://schemas.openxmlformats.org/officeDocument/2006/customXml" ds:itemID="{41E7CA09-9778-4414-AE97-8064B12DA30E}">
   <ds:schemaRefs>
     <ds:schemaRef ds:uri="http://schemas.microsoft.com/office/2006/metadata/contentType"/>
@@ -9132,22 +9402,4 @@
     <ds:schemaRef ds:uri="http://schemas.microsoft.com/internal/obd"/>
   </ds:schemaRefs>
 </ds:datastoreItem>
-</file>
-
-<file path=customXml/itemProps2.xml><?xml version="1.0" encoding="utf-8"?>
-<ds:datastoreItem xmlns:ds="http://schemas.openxmlformats.org/officeDocument/2006/customXml" ds:itemID="{927BD4C1-B6B1-4715-ABF9-E660A51A4EA0}">
-  <ds:schemaRefs>
-    <ds:schemaRef ds:uri="http://schemas.microsoft.com/sharepoint/v3/contenttype/forms"/>
-  </ds:schemaRefs>
-</ds:datastoreItem>
-</file>
-
-<file path=customXml/itemProps3.xml><?xml version="1.0" encoding="utf-8"?>
-<ds:datastoreItem xmlns:ds="http://schemas.openxmlformats.org/officeDocument/2006/customXml" ds:itemID="{8D289AE2-D2AE-49D1-AFAC-3A79F6794255}">
-  <ds:schemaRefs>
-    <ds:schemaRef ds:uri="http://schemas.microsoft.com/office/2006/metadata/properties"/>
-    <ds:schemaRef ds:uri="http://schemas.microsoft.com/office/infopath/2007/PartnerControls"/>
-    <ds:schemaRef ds:uri="71af3243-3dd4-4a8d-8c0d-dd76da1f02a5"/>
-  </ds:schemaRefs>
-</ds:datastoreItem>
 </file>
</xml_diff>

<commit_message>
ADO.Net Clustering (Three silos).
</commit_message>
<xml_diff>
--- a/Presentation/Microsoft Orleans.pptx
+++ b/Presentation/Microsoft Orleans.pptx
@@ -34,6 +34,7 @@
     <p:sldId id="284" r:id="rId31"/>
     <p:sldId id="285" r:id="rId32"/>
     <p:sldId id="286" r:id="rId33"/>
+    <p:sldId id="287" r:id="rId34"/>
   </p:sldIdLst>
   <p:sldSz cx="12192000" cy="6858000"/>
   <p:notesSz cx="6858000" cy="9144000"/>
@@ -7648,13 +7649,8 @@
           <a:p>
             <a:r>
               <a:rPr lang="en-US" dirty="0"/>
-              <a:t>With a little of magic, we can prevent application causing before application save state and performs </a:t>
-            </a:r>
-            <a:r>
-              <a:rPr lang="en-US"/>
-              <a:t>graceful shutdown.</a:t>
-            </a:r>
-            <a:endParaRPr lang="en-US" dirty="0"/>
+              <a:t>With a little of magic, we can prevent application causing before application save state and performs graceful shutdown.</a:t>
+            </a:r>
           </a:p>
         </p:txBody>
       </p:sp>
@@ -7824,6 +7820,254 @@
     <p:extLst>
       <p:ext uri="{BB962C8B-B14F-4D97-AF65-F5344CB8AC3E}">
         <p14:creationId xmlns:p14="http://schemas.microsoft.com/office/powerpoint/2010/main" val="3687767941"/>
+      </p:ext>
+    </p:extLst>
+  </p:cSld>
+  <p:clrMapOvr>
+    <a:masterClrMapping/>
+  </p:clrMapOvr>
+</p:sld>
+</file>
+
+<file path=ppt/slides/slide30.xml><?xml version="1.0" encoding="utf-8"?>
+<p:sld xmlns:a="http://schemas.openxmlformats.org/drawingml/2006/main" xmlns:r="http://schemas.openxmlformats.org/officeDocument/2006/relationships" xmlns:p="http://schemas.openxmlformats.org/presentationml/2006/main">
+  <p:cSld>
+    <p:spTree>
+      <p:nvGrpSpPr>
+        <p:cNvPr id="1" name=""/>
+        <p:cNvGrpSpPr/>
+        <p:nvPr/>
+      </p:nvGrpSpPr>
+      <p:grpSpPr>
+        <a:xfrm>
+          <a:off x="0" y="0"/>
+          <a:ext cx="0" cy="0"/>
+          <a:chOff x="0" y="0"/>
+          <a:chExt cx="0" cy="0"/>
+        </a:xfrm>
+      </p:grpSpPr>
+      <p:sp>
+        <p:nvSpPr>
+          <p:cNvPr id="2" name="Title 1">
+            <a:extLst>
+              <a:ext uri="{FF2B5EF4-FFF2-40B4-BE49-F238E27FC236}">
+                <a16:creationId xmlns:a16="http://schemas.microsoft.com/office/drawing/2014/main" id="{9803256C-2039-4CA5-8028-8CE5F289B420}"/>
+              </a:ext>
+            </a:extLst>
+          </p:cNvPr>
+          <p:cNvSpPr>
+            <a:spLocks noGrp="1"/>
+          </p:cNvSpPr>
+          <p:nvPr>
+            <p:ph type="title"/>
+          </p:nvPr>
+        </p:nvSpPr>
+        <p:spPr>
+          <a:xfrm>
+            <a:off x="581192" y="702156"/>
+            <a:ext cx="11029616" cy="564582"/>
+          </a:xfrm>
+        </p:spPr>
+        <p:txBody>
+          <a:bodyPr/>
+          <a:lstStyle/>
+          <a:p>
+            <a:r>
+              <a:rPr lang="en-US" dirty="0"/>
+              <a:t>Orleans clustering with ADO.net</a:t>
+            </a:r>
+          </a:p>
+        </p:txBody>
+      </p:sp>
+      <p:sp>
+        <p:nvSpPr>
+          <p:cNvPr id="4" name="TextBox 3">
+            <a:extLst>
+              <a:ext uri="{FF2B5EF4-FFF2-40B4-BE49-F238E27FC236}">
+                <a16:creationId xmlns:a16="http://schemas.microsoft.com/office/drawing/2014/main" id="{20E4DD2D-B25A-48ED-A3B2-3CC07C2B9233}"/>
+              </a:ext>
+            </a:extLst>
+          </p:cNvPr>
+          <p:cNvSpPr txBox="1"/>
+          <p:nvPr/>
+        </p:nvSpPr>
+        <p:spPr>
+          <a:xfrm>
+            <a:off x="327171" y="1266738"/>
+            <a:ext cx="11723274" cy="2031325"/>
+          </a:xfrm>
+          <a:prstGeom prst="rect">
+            <a:avLst/>
+          </a:prstGeom>
+          <a:noFill/>
+        </p:spPr>
+        <p:txBody>
+          <a:bodyPr wrap="none" rtlCol="0">
+            <a:spAutoFit/>
+          </a:bodyPr>
+          <a:lstStyle/>
+          <a:p>
+            <a:pPr marL="285750" indent="-285750">
+              <a:buFont typeface="Arial" panose="020B0604020202020204" pitchFamily="34" charset="0"/>
+              <a:buChar char="•"/>
+            </a:pPr>
+            <a:r>
+              <a:rPr lang="en-US" dirty="0"/>
+              <a:t>Orleans clustering is based on built-in membership protocol.</a:t>
+            </a:r>
+          </a:p>
+          <a:p>
+            <a:pPr marL="285750" indent="-285750">
+              <a:buFont typeface="Arial" panose="020B0604020202020204" pitchFamily="34" charset="0"/>
+              <a:buChar char="•"/>
+            </a:pPr>
+            <a:r>
+              <a:rPr lang="en-US" dirty="0"/>
+              <a:t>Silos are agreeing on currently live silos. They detect failed ones and allow new silos to connect to the cluster.</a:t>
+            </a:r>
+          </a:p>
+          <a:p>
+            <a:pPr marL="285750" indent="-285750">
+              <a:buFont typeface="Arial" panose="020B0604020202020204" pitchFamily="34" charset="0"/>
+              <a:buChar char="•"/>
+            </a:pPr>
+            <a:r>
+              <a:rPr lang="en-US" dirty="0"/>
+              <a:t>On Startup, each Silo writes to membership table.</a:t>
+            </a:r>
+          </a:p>
+          <a:p>
+            <a:pPr marL="285750" indent="-285750">
+              <a:buFont typeface="Arial" panose="020B0604020202020204" pitchFamily="34" charset="0"/>
+              <a:buChar char="•"/>
+            </a:pPr>
+            <a:r>
+              <a:rPr lang="en-US" dirty="0"/>
+              <a:t>All Silos ping with each other with messages called heart-beats.</a:t>
+            </a:r>
+          </a:p>
+          <a:p>
+            <a:pPr marL="285750" indent="-285750">
+              <a:buFont typeface="Arial" panose="020B0604020202020204" pitchFamily="34" charset="0"/>
+              <a:buChar char="•"/>
+            </a:pPr>
+            <a:r>
+              <a:rPr lang="en-US" dirty="0"/>
+              <a:t>If one Silo starts pinging, then other silos will decide that one silo is not responding. They write a suspicious state to </a:t>
+            </a:r>
+          </a:p>
+          <a:p>
+            <a:r>
+              <a:rPr lang="en-US" dirty="0"/>
+              <a:t>     membership table. One suspicion is not enough to decide that silo is dead. </a:t>
+            </a:r>
+          </a:p>
+          <a:p>
+            <a:r>
+              <a:rPr lang="en-US" dirty="0"/>
+              <a:t>     All the silos need to conform that Silo is dead.</a:t>
+            </a:r>
+          </a:p>
+        </p:txBody>
+      </p:sp>
+      <p:pic>
+        <p:nvPicPr>
+          <p:cNvPr id="5" name="Picture 4">
+            <a:extLst>
+              <a:ext uri="{FF2B5EF4-FFF2-40B4-BE49-F238E27FC236}">
+                <a16:creationId xmlns:a16="http://schemas.microsoft.com/office/drawing/2014/main" id="{78FC33E6-5630-49FB-B56C-5E9323F54A4B}"/>
+              </a:ext>
+            </a:extLst>
+          </p:cNvPr>
+          <p:cNvPicPr>
+            <a:picLocks noChangeAspect="1"/>
+          </p:cNvPicPr>
+          <p:nvPr/>
+        </p:nvPicPr>
+        <p:blipFill>
+          <a:blip r:embed="rId2"/>
+          <a:stretch>
+            <a:fillRect/>
+          </a:stretch>
+        </p:blipFill>
+        <p:spPr>
+          <a:xfrm>
+            <a:off x="0" y="3862644"/>
+            <a:ext cx="9467850" cy="3015007"/>
+          </a:xfrm>
+          <a:prstGeom prst="rect">
+            <a:avLst/>
+          </a:prstGeom>
+        </p:spPr>
+      </p:pic>
+      <p:sp>
+        <p:nvSpPr>
+          <p:cNvPr id="6" name="TextBox 5">
+            <a:extLst>
+              <a:ext uri="{FF2B5EF4-FFF2-40B4-BE49-F238E27FC236}">
+                <a16:creationId xmlns:a16="http://schemas.microsoft.com/office/drawing/2014/main" id="{EEDBBADE-E9EF-46AE-9848-3B22694D2F17}"/>
+              </a:ext>
+            </a:extLst>
+          </p:cNvPr>
+          <p:cNvSpPr txBox="1"/>
+          <p:nvPr/>
+        </p:nvSpPr>
+        <p:spPr>
+          <a:xfrm>
+            <a:off x="0" y="3274736"/>
+            <a:ext cx="11389080" cy="646331"/>
+          </a:xfrm>
+          <a:prstGeom prst="rect">
+            <a:avLst/>
+          </a:prstGeom>
+          <a:noFill/>
+        </p:spPr>
+        <p:txBody>
+          <a:bodyPr wrap="none" rtlCol="0">
+            <a:spAutoFit/>
+          </a:bodyPr>
+          <a:lstStyle/>
+          <a:p>
+            <a:r>
+              <a:rPr lang="en-US" dirty="0">
+                <a:hlinkClick r:id="rId3"/>
+              </a:rPr>
+              <a:t>https://github.com/dotnet/orleans/blob/master/src/AdoNet/Orleans.Clustering.AdoNet/PostgreSQL-Clustering.sql</a:t>
+            </a:r>
+            <a:r>
+              <a:rPr lang="en-US" dirty="0"/>
+              <a:t> </a:t>
+            </a:r>
+          </a:p>
+          <a:p>
+            <a:r>
+              <a:rPr lang="en-US" dirty="0"/>
+              <a:t>(</a:t>
+            </a:r>
+            <a:r>
+              <a:rPr lang="en-US" dirty="0" err="1"/>
+              <a:t>orleansmembershiptable</a:t>
+            </a:r>
+            <a:r>
+              <a:rPr lang="en-US" dirty="0"/>
+              <a:t>, </a:t>
+            </a:r>
+            <a:r>
+              <a:rPr lang="en-US" dirty="0" err="1"/>
+              <a:t>orleansmembershipversiontable</a:t>
+            </a:r>
+            <a:r>
+              <a:rPr lang="en-US"/>
+              <a:t>)</a:t>
+            </a:r>
+            <a:endParaRPr lang="en-US" dirty="0"/>
+          </a:p>
+        </p:txBody>
+      </p:sp>
+    </p:spTree>
+    <p:extLst>
+      <p:ext uri="{BB962C8B-B14F-4D97-AF65-F5344CB8AC3E}">
+        <p14:creationId xmlns:p14="http://schemas.microsoft.com/office/powerpoint/2010/main" val="1792782737"/>
       </p:ext>
     </p:extLst>
   </p:cSld>

</xml_diff>

<commit_message>
Orleans clustering for Kubernetes.
</commit_message>
<xml_diff>
--- a/Presentation/Microsoft Orleans.pptx
+++ b/Presentation/Microsoft Orleans.pptx
@@ -35,6 +35,8 @@
     <p:sldId id="285" r:id="rId32"/>
     <p:sldId id="286" r:id="rId33"/>
     <p:sldId id="287" r:id="rId34"/>
+    <p:sldId id="288" r:id="rId35"/>
+    <p:sldId id="289" r:id="rId36"/>
   </p:sldIdLst>
   <p:sldSz cx="12192000" cy="6858000"/>
   <p:notesSz cx="6858000" cy="9144000"/>
@@ -379,7 +381,7 @@
           <a:p>
             <a:fld id="{ED291B17-9318-49DB-B28B-6E5994AE9581}" type="datetime1">
               <a:rPr lang="en-US" smtClean="0"/>
-              <a:t>1/19/2021</a:t>
+              <a:t>1/22/2021</a:t>
             </a:fld>
             <a:endParaRPr lang="en-US" dirty="0"/>
           </a:p>
@@ -582,7 +584,7 @@
           <a:p>
             <a:fld id="{2CED4963-E985-44C4-B8C4-FDD613B7C2F8}" type="datetime1">
               <a:rPr lang="en-US" smtClean="0"/>
-              <a:t>1/19/2021</a:t>
+              <a:t>1/22/2021</a:t>
             </a:fld>
             <a:endParaRPr lang="en-US" dirty="0"/>
           </a:p>
@@ -944,7 +946,7 @@
           <a:p>
             <a:fld id="{ED291B17-9318-49DB-B28B-6E5994AE9581}" type="datetime1">
               <a:rPr lang="en-US" smtClean="0"/>
-              <a:t>1/19/2021</a:t>
+              <a:t>1/22/2021</a:t>
             </a:fld>
             <a:endParaRPr lang="en-US" dirty="0"/>
           </a:p>
@@ -1142,7 +1144,7 @@
           <a:p>
             <a:fld id="{78DD82B9-B8EE-4375-B6FF-88FA6ABB15D9}" type="datetime1">
               <a:rPr lang="en-US" smtClean="0"/>
-              <a:t>1/19/2021</a:t>
+              <a:t>1/22/2021</a:t>
             </a:fld>
             <a:endParaRPr lang="en-US" dirty="0"/>
           </a:p>
@@ -1454,7 +1456,7 @@
           <a:p>
             <a:fld id="{B2497495-0637-405E-AE64-5CC7506D51F5}" type="datetime1">
               <a:rPr lang="en-US" smtClean="0"/>
-              <a:t>1/19/2021</a:t>
+              <a:t>1/22/2021</a:t>
             </a:fld>
             <a:endParaRPr lang="en-US" dirty="0"/>
           </a:p>
@@ -1707,7 +1709,7 @@
           <a:p>
             <a:fld id="{7BFFD690-9426-415D-8B65-26881E07B2D4}" type="datetime1">
               <a:rPr lang="en-US" smtClean="0"/>
-              <a:t>1/19/2021</a:t>
+              <a:t>1/22/2021</a:t>
             </a:fld>
             <a:endParaRPr lang="en-US" dirty="0"/>
           </a:p>
@@ -2129,7 +2131,7 @@
           <a:p>
             <a:fld id="{04C4989A-474C-40DE-95B9-011C28B71673}" type="datetime1">
               <a:rPr lang="en-US" smtClean="0"/>
-              <a:t>1/19/2021</a:t>
+              <a:t>1/22/2021</a:t>
             </a:fld>
             <a:endParaRPr lang="en-US" dirty="0"/>
           </a:p>
@@ -2252,7 +2254,7 @@
           <a:p>
             <a:fld id="{5DB4ED54-5B5E-4A04-93D3-5772E3CE3818}" type="datetime1">
               <a:rPr lang="en-US" smtClean="0"/>
-              <a:t>1/19/2021</a:t>
+              <a:t>1/22/2021</a:t>
             </a:fld>
             <a:endParaRPr lang="en-US" dirty="0"/>
           </a:p>
@@ -2347,7 +2349,7 @@
           <a:p>
             <a:fld id="{4EDE50D6-574B-40AF-946F-D52A04ADE379}" type="datetime1">
               <a:rPr lang="en-US" smtClean="0"/>
-              <a:t>1/19/2021</a:t>
+              <a:t>1/22/2021</a:t>
             </a:fld>
             <a:endParaRPr lang="en-US" dirty="0"/>
           </a:p>
@@ -2724,7 +2726,7 @@
           <a:p>
             <a:fld id="{D82884F1-FFEA-405F-9602-3DCA865EDA4E}" type="datetime1">
               <a:rPr lang="en-US" smtClean="0"/>
-              <a:t>1/19/2021</a:t>
+              <a:t>1/22/2021</a:t>
             </a:fld>
             <a:endParaRPr lang="en-US" dirty="0"/>
           </a:p>
@@ -3017,7 +3019,7 @@
           <a:p>
             <a:fld id="{7E18DB4A-8810-4A10-AD5C-D5E2C667F5B3}" type="datetime1">
               <a:rPr lang="en-US" smtClean="0"/>
-              <a:t>1/19/2021</a:t>
+              <a:t>1/22/2021</a:t>
             </a:fld>
             <a:endParaRPr lang="en-US" dirty="0"/>
           </a:p>
@@ -3232,7 +3234,7 @@
           <a:p>
             <a:fld id="{ED291B17-9318-49DB-B28B-6E5994AE9581}" type="datetime1">
               <a:rPr lang="en-US" smtClean="0"/>
-              <a:t>1/19/2021</a:t>
+              <a:t>1/22/2021</a:t>
             </a:fld>
             <a:endParaRPr lang="en-US" dirty="0"/>
           </a:p>
@@ -8068,6 +8070,537 @@
     <p:extLst>
       <p:ext uri="{BB962C8B-B14F-4D97-AF65-F5344CB8AC3E}">
         <p14:creationId xmlns:p14="http://schemas.microsoft.com/office/powerpoint/2010/main" val="1792782737"/>
+      </p:ext>
+    </p:extLst>
+  </p:cSld>
+  <p:clrMapOvr>
+    <a:masterClrMapping/>
+  </p:clrMapOvr>
+</p:sld>
+</file>
+
+<file path=ppt/slides/slide31.xml><?xml version="1.0" encoding="utf-8"?>
+<p:sld xmlns:a="http://schemas.openxmlformats.org/drawingml/2006/main" xmlns:r="http://schemas.openxmlformats.org/officeDocument/2006/relationships" xmlns:p="http://schemas.openxmlformats.org/presentationml/2006/main">
+  <p:cSld>
+    <p:spTree>
+      <p:nvGrpSpPr>
+        <p:cNvPr id="1" name=""/>
+        <p:cNvGrpSpPr/>
+        <p:nvPr/>
+      </p:nvGrpSpPr>
+      <p:grpSpPr>
+        <a:xfrm>
+          <a:off x="0" y="0"/>
+          <a:ext cx="0" cy="0"/>
+          <a:chOff x="0" y="0"/>
+          <a:chExt cx="0" cy="0"/>
+        </a:xfrm>
+      </p:grpSpPr>
+      <p:sp>
+        <p:nvSpPr>
+          <p:cNvPr id="2" name="Title 1">
+            <a:extLst>
+              <a:ext uri="{FF2B5EF4-FFF2-40B4-BE49-F238E27FC236}">
+                <a16:creationId xmlns:a16="http://schemas.microsoft.com/office/drawing/2014/main" id="{BA767F96-928E-453A-8997-A0B901BFF203}"/>
+              </a:ext>
+            </a:extLst>
+          </p:cNvPr>
+          <p:cNvSpPr>
+            <a:spLocks noGrp="1"/>
+          </p:cNvSpPr>
+          <p:nvPr>
+            <p:ph type="title"/>
+          </p:nvPr>
+        </p:nvSpPr>
+        <p:spPr>
+          <a:xfrm>
+            <a:off x="581192" y="702156"/>
+            <a:ext cx="11029616" cy="455525"/>
+          </a:xfrm>
+        </p:spPr>
+        <p:txBody>
+          <a:bodyPr>
+            <a:normAutofit fontScale="90000"/>
+          </a:bodyPr>
+          <a:lstStyle/>
+          <a:p>
+            <a:r>
+              <a:rPr lang="en-US" dirty="0"/>
+              <a:t>Orleans in KUBERNETES</a:t>
+            </a:r>
+          </a:p>
+        </p:txBody>
+      </p:sp>
+      <p:pic>
+        <p:nvPicPr>
+          <p:cNvPr id="5" name="Picture 4">
+            <a:extLst>
+              <a:ext uri="{FF2B5EF4-FFF2-40B4-BE49-F238E27FC236}">
+                <a16:creationId xmlns:a16="http://schemas.microsoft.com/office/drawing/2014/main" id="{38073C7A-32B4-460C-B5D7-39D5838DC91D}"/>
+              </a:ext>
+            </a:extLst>
+          </p:cNvPr>
+          <p:cNvPicPr>
+            <a:picLocks noChangeAspect="1"/>
+          </p:cNvPicPr>
+          <p:nvPr/>
+        </p:nvPicPr>
+        <p:blipFill>
+          <a:blip r:embed="rId2"/>
+          <a:stretch>
+            <a:fillRect/>
+          </a:stretch>
+        </p:blipFill>
+        <p:spPr>
+          <a:xfrm>
+            <a:off x="407783" y="1613206"/>
+            <a:ext cx="7534275" cy="523875"/>
+          </a:xfrm>
+          <a:prstGeom prst="rect">
+            <a:avLst/>
+          </a:prstGeom>
+        </p:spPr>
+      </p:pic>
+      <p:sp>
+        <p:nvSpPr>
+          <p:cNvPr id="6" name="TextBox 5">
+            <a:extLst>
+              <a:ext uri="{FF2B5EF4-FFF2-40B4-BE49-F238E27FC236}">
+                <a16:creationId xmlns:a16="http://schemas.microsoft.com/office/drawing/2014/main" id="{6334FE4B-73BA-4838-A3A8-BDF1966CD920}"/>
+              </a:ext>
+            </a:extLst>
+          </p:cNvPr>
+          <p:cNvSpPr txBox="1"/>
+          <p:nvPr/>
+        </p:nvSpPr>
+        <p:spPr>
+          <a:xfrm>
+            <a:off x="520118" y="1157681"/>
+            <a:ext cx="8853578" cy="646331"/>
+          </a:xfrm>
+          <a:prstGeom prst="rect">
+            <a:avLst/>
+          </a:prstGeom>
+          <a:noFill/>
+        </p:spPr>
+        <p:txBody>
+          <a:bodyPr wrap="none" rtlCol="0">
+            <a:spAutoFit/>
+          </a:bodyPr>
+          <a:lstStyle/>
+          <a:p>
+            <a:r>
+              <a:rPr lang="en-US" b="1" dirty="0">
+                <a:hlinkClick r:id="rId3"/>
+              </a:rPr>
+              <a:t>https://github.com/OrleansContrib/Orleans.Clustering.Kubernetes/tree/master/samples</a:t>
+            </a:r>
+            <a:endParaRPr lang="en-US" b="1" dirty="0"/>
+          </a:p>
+          <a:p>
+            <a:endParaRPr lang="en-US" b="1" dirty="0"/>
+          </a:p>
+        </p:txBody>
+      </p:sp>
+      <p:pic>
+        <p:nvPicPr>
+          <p:cNvPr id="7" name="Picture 6">
+            <a:extLst>
+              <a:ext uri="{FF2B5EF4-FFF2-40B4-BE49-F238E27FC236}">
+                <a16:creationId xmlns:a16="http://schemas.microsoft.com/office/drawing/2014/main" id="{789425F9-F58F-4635-B702-855A18F30083}"/>
+              </a:ext>
+            </a:extLst>
+          </p:cNvPr>
+          <p:cNvPicPr>
+            <a:picLocks noChangeAspect="1"/>
+          </p:cNvPicPr>
+          <p:nvPr/>
+        </p:nvPicPr>
+        <p:blipFill>
+          <a:blip r:embed="rId4"/>
+          <a:stretch>
+            <a:fillRect/>
+          </a:stretch>
+        </p:blipFill>
+        <p:spPr>
+          <a:xfrm>
+            <a:off x="0" y="2352872"/>
+            <a:ext cx="12192000" cy="236994"/>
+          </a:xfrm>
+          <a:prstGeom prst="rect">
+            <a:avLst/>
+          </a:prstGeom>
+        </p:spPr>
+      </p:pic>
+      <p:pic>
+        <p:nvPicPr>
+          <p:cNvPr id="8" name="Picture 7">
+            <a:extLst>
+              <a:ext uri="{FF2B5EF4-FFF2-40B4-BE49-F238E27FC236}">
+                <a16:creationId xmlns:a16="http://schemas.microsoft.com/office/drawing/2014/main" id="{DAFDD4A9-6F3B-493F-B063-B2BC8B6C8B25}"/>
+              </a:ext>
+            </a:extLst>
+          </p:cNvPr>
+          <p:cNvPicPr>
+            <a:picLocks noChangeAspect="1"/>
+          </p:cNvPicPr>
+          <p:nvPr/>
+        </p:nvPicPr>
+        <p:blipFill>
+          <a:blip r:embed="rId5"/>
+          <a:stretch>
+            <a:fillRect/>
+          </a:stretch>
+        </p:blipFill>
+        <p:spPr>
+          <a:xfrm>
+            <a:off x="0" y="2877926"/>
+            <a:ext cx="12192000" cy="246469"/>
+          </a:xfrm>
+          <a:prstGeom prst="rect">
+            <a:avLst/>
+          </a:prstGeom>
+        </p:spPr>
+      </p:pic>
+      <p:pic>
+        <p:nvPicPr>
+          <p:cNvPr id="9" name="Picture 8">
+            <a:extLst>
+              <a:ext uri="{FF2B5EF4-FFF2-40B4-BE49-F238E27FC236}">
+                <a16:creationId xmlns:a16="http://schemas.microsoft.com/office/drawing/2014/main" id="{04BE9580-7D94-4213-9F20-C6FFCAD1AE12}"/>
+              </a:ext>
+            </a:extLst>
+          </p:cNvPr>
+          <p:cNvPicPr>
+            <a:picLocks noChangeAspect="1"/>
+          </p:cNvPicPr>
+          <p:nvPr/>
+        </p:nvPicPr>
+        <p:blipFill>
+          <a:blip r:embed="rId6"/>
+          <a:stretch>
+            <a:fillRect/>
+          </a:stretch>
+        </p:blipFill>
+        <p:spPr>
+          <a:xfrm>
+            <a:off x="0" y="3325969"/>
+            <a:ext cx="12192000" cy="206062"/>
+          </a:xfrm>
+          <a:prstGeom prst="rect">
+            <a:avLst/>
+          </a:prstGeom>
+        </p:spPr>
+      </p:pic>
+      <p:pic>
+        <p:nvPicPr>
+          <p:cNvPr id="10" name="Picture 9">
+            <a:extLst>
+              <a:ext uri="{FF2B5EF4-FFF2-40B4-BE49-F238E27FC236}">
+                <a16:creationId xmlns:a16="http://schemas.microsoft.com/office/drawing/2014/main" id="{6A0DD657-4C9D-4B57-BA53-4598169FF29A}"/>
+              </a:ext>
+            </a:extLst>
+          </p:cNvPr>
+          <p:cNvPicPr>
+            <a:picLocks noChangeAspect="1"/>
+          </p:cNvPicPr>
+          <p:nvPr/>
+        </p:nvPicPr>
+        <p:blipFill>
+          <a:blip r:embed="rId7"/>
+          <a:stretch>
+            <a:fillRect/>
+          </a:stretch>
+        </p:blipFill>
+        <p:spPr>
+          <a:xfrm>
+            <a:off x="18176" y="3616378"/>
+            <a:ext cx="12192000" cy="198492"/>
+          </a:xfrm>
+          <a:prstGeom prst="rect">
+            <a:avLst/>
+          </a:prstGeom>
+        </p:spPr>
+      </p:pic>
+      <p:pic>
+        <p:nvPicPr>
+          <p:cNvPr id="11" name="Picture 10">
+            <a:extLst>
+              <a:ext uri="{FF2B5EF4-FFF2-40B4-BE49-F238E27FC236}">
+                <a16:creationId xmlns:a16="http://schemas.microsoft.com/office/drawing/2014/main" id="{04347935-9084-4DF8-9CFB-9B6DD7A9FA80}"/>
+              </a:ext>
+            </a:extLst>
+          </p:cNvPr>
+          <p:cNvPicPr>
+            <a:picLocks noChangeAspect="1"/>
+          </p:cNvPicPr>
+          <p:nvPr/>
+        </p:nvPicPr>
+        <p:blipFill>
+          <a:blip r:embed="rId8"/>
+          <a:stretch>
+            <a:fillRect/>
+          </a:stretch>
+        </p:blipFill>
+        <p:spPr>
+          <a:xfrm>
+            <a:off x="18176" y="3935628"/>
+            <a:ext cx="12192000" cy="197556"/>
+          </a:xfrm>
+          <a:prstGeom prst="rect">
+            <a:avLst/>
+          </a:prstGeom>
+        </p:spPr>
+      </p:pic>
+      <p:pic>
+        <p:nvPicPr>
+          <p:cNvPr id="12" name="Picture 11">
+            <a:extLst>
+              <a:ext uri="{FF2B5EF4-FFF2-40B4-BE49-F238E27FC236}">
+                <a16:creationId xmlns:a16="http://schemas.microsoft.com/office/drawing/2014/main" id="{9BB75106-3565-47A1-A98C-8EBF8F04CAA0}"/>
+              </a:ext>
+            </a:extLst>
+          </p:cNvPr>
+          <p:cNvPicPr>
+            <a:picLocks noChangeAspect="1"/>
+          </p:cNvPicPr>
+          <p:nvPr/>
+        </p:nvPicPr>
+        <p:blipFill>
+          <a:blip r:embed="rId9"/>
+          <a:stretch>
+            <a:fillRect/>
+          </a:stretch>
+        </p:blipFill>
+        <p:spPr>
+          <a:xfrm>
+            <a:off x="0" y="4249316"/>
+            <a:ext cx="12192000" cy="288838"/>
+          </a:xfrm>
+          <a:prstGeom prst="rect">
+            <a:avLst/>
+          </a:prstGeom>
+        </p:spPr>
+      </p:pic>
+      <p:pic>
+        <p:nvPicPr>
+          <p:cNvPr id="13" name="Picture 12">
+            <a:extLst>
+              <a:ext uri="{FF2B5EF4-FFF2-40B4-BE49-F238E27FC236}">
+                <a16:creationId xmlns:a16="http://schemas.microsoft.com/office/drawing/2014/main" id="{6CB51927-77B4-4243-8DC1-E7511FBCBE9B}"/>
+              </a:ext>
+            </a:extLst>
+          </p:cNvPr>
+          <p:cNvPicPr>
+            <a:picLocks noChangeAspect="1"/>
+          </p:cNvPicPr>
+          <p:nvPr/>
+        </p:nvPicPr>
+        <p:blipFill>
+          <a:blip r:embed="rId10"/>
+          <a:stretch>
+            <a:fillRect/>
+          </a:stretch>
+        </p:blipFill>
+        <p:spPr>
+          <a:xfrm>
+            <a:off x="18176" y="4819949"/>
+            <a:ext cx="11068050" cy="1200150"/>
+          </a:xfrm>
+          <a:prstGeom prst="rect">
+            <a:avLst/>
+          </a:prstGeom>
+        </p:spPr>
+      </p:pic>
+    </p:spTree>
+    <p:extLst>
+      <p:ext uri="{BB962C8B-B14F-4D97-AF65-F5344CB8AC3E}">
+        <p14:creationId xmlns:p14="http://schemas.microsoft.com/office/powerpoint/2010/main" val="900075045"/>
+      </p:ext>
+    </p:extLst>
+  </p:cSld>
+  <p:clrMapOvr>
+    <a:masterClrMapping/>
+  </p:clrMapOvr>
+</p:sld>
+</file>
+
+<file path=ppt/slides/slide32.xml><?xml version="1.0" encoding="utf-8"?>
+<p:sld xmlns:a="http://schemas.openxmlformats.org/drawingml/2006/main" xmlns:r="http://schemas.openxmlformats.org/officeDocument/2006/relationships" xmlns:p="http://schemas.openxmlformats.org/presentationml/2006/main">
+  <p:cSld>
+    <p:spTree>
+      <p:nvGrpSpPr>
+        <p:cNvPr id="1" name=""/>
+        <p:cNvGrpSpPr/>
+        <p:nvPr/>
+      </p:nvGrpSpPr>
+      <p:grpSpPr>
+        <a:xfrm>
+          <a:off x="0" y="0"/>
+          <a:ext cx="0" cy="0"/>
+          <a:chOff x="0" y="0"/>
+          <a:chExt cx="0" cy="0"/>
+        </a:xfrm>
+      </p:grpSpPr>
+      <p:sp>
+        <p:nvSpPr>
+          <p:cNvPr id="2" name="Title 1">
+            <a:extLst>
+              <a:ext uri="{FF2B5EF4-FFF2-40B4-BE49-F238E27FC236}">
+                <a16:creationId xmlns:a16="http://schemas.microsoft.com/office/drawing/2014/main" id="{60D08D7D-E144-41AE-8AB0-6C7A3B3B3A59}"/>
+              </a:ext>
+            </a:extLst>
+          </p:cNvPr>
+          <p:cNvSpPr>
+            <a:spLocks noGrp="1"/>
+          </p:cNvSpPr>
+          <p:nvPr>
+            <p:ph type="title"/>
+          </p:nvPr>
+        </p:nvSpPr>
+        <p:spPr>
+          <a:xfrm>
+            <a:off x="581192" y="702156"/>
+            <a:ext cx="11029616" cy="455525"/>
+          </a:xfrm>
+        </p:spPr>
+        <p:txBody>
+          <a:bodyPr>
+            <a:normAutofit fontScale="90000"/>
+          </a:bodyPr>
+          <a:lstStyle/>
+          <a:p>
+            <a:r>
+              <a:rPr lang="en-US" dirty="0"/>
+              <a:t>Custom RESOURCE DEFINITIONS</a:t>
+            </a:r>
+          </a:p>
+        </p:txBody>
+      </p:sp>
+      <p:pic>
+        <p:nvPicPr>
+          <p:cNvPr id="5" name="Picture 4">
+            <a:extLst>
+              <a:ext uri="{FF2B5EF4-FFF2-40B4-BE49-F238E27FC236}">
+                <a16:creationId xmlns:a16="http://schemas.microsoft.com/office/drawing/2014/main" id="{E681DAA5-1640-4CB9-9530-2806F23F6389}"/>
+              </a:ext>
+            </a:extLst>
+          </p:cNvPr>
+          <p:cNvPicPr>
+            <a:picLocks noChangeAspect="1"/>
+          </p:cNvPicPr>
+          <p:nvPr/>
+        </p:nvPicPr>
+        <p:blipFill>
+          <a:blip r:embed="rId2"/>
+          <a:stretch>
+            <a:fillRect/>
+          </a:stretch>
+        </p:blipFill>
+        <p:spPr>
+          <a:xfrm>
+            <a:off x="201336" y="1157681"/>
+            <a:ext cx="9239250" cy="495300"/>
+          </a:xfrm>
+          <a:prstGeom prst="rect">
+            <a:avLst/>
+          </a:prstGeom>
+        </p:spPr>
+      </p:pic>
+      <p:pic>
+        <p:nvPicPr>
+          <p:cNvPr id="6" name="Picture 5">
+            <a:extLst>
+              <a:ext uri="{FF2B5EF4-FFF2-40B4-BE49-F238E27FC236}">
+                <a16:creationId xmlns:a16="http://schemas.microsoft.com/office/drawing/2014/main" id="{18D68B2A-A793-43C0-B354-B34E7B4F1AC5}"/>
+              </a:ext>
+            </a:extLst>
+          </p:cNvPr>
+          <p:cNvPicPr>
+            <a:picLocks noChangeAspect="1"/>
+          </p:cNvPicPr>
+          <p:nvPr/>
+        </p:nvPicPr>
+        <p:blipFill>
+          <a:blip r:embed="rId3"/>
+          <a:stretch>
+            <a:fillRect/>
+          </a:stretch>
+        </p:blipFill>
+        <p:spPr>
+          <a:xfrm>
+            <a:off x="201336" y="1851331"/>
+            <a:ext cx="7972425" cy="514350"/>
+          </a:xfrm>
+          <a:prstGeom prst="rect">
+            <a:avLst/>
+          </a:prstGeom>
+        </p:spPr>
+      </p:pic>
+      <p:pic>
+        <p:nvPicPr>
+          <p:cNvPr id="7" name="Picture 6">
+            <a:extLst>
+              <a:ext uri="{FF2B5EF4-FFF2-40B4-BE49-F238E27FC236}">
+                <a16:creationId xmlns:a16="http://schemas.microsoft.com/office/drawing/2014/main" id="{73D8C559-5751-4F7D-AEC6-882E56BB6517}"/>
+              </a:ext>
+            </a:extLst>
+          </p:cNvPr>
+          <p:cNvPicPr>
+            <a:picLocks noChangeAspect="1"/>
+          </p:cNvPicPr>
+          <p:nvPr/>
+        </p:nvPicPr>
+        <p:blipFill>
+          <a:blip r:embed="rId4"/>
+          <a:stretch>
+            <a:fillRect/>
+          </a:stretch>
+        </p:blipFill>
+        <p:spPr>
+          <a:xfrm>
+            <a:off x="201336" y="2519989"/>
+            <a:ext cx="10506075" cy="904875"/>
+          </a:xfrm>
+          <a:prstGeom prst="rect">
+            <a:avLst/>
+          </a:prstGeom>
+        </p:spPr>
+      </p:pic>
+      <p:pic>
+        <p:nvPicPr>
+          <p:cNvPr id="3" name="Picture 2">
+            <a:extLst>
+              <a:ext uri="{FF2B5EF4-FFF2-40B4-BE49-F238E27FC236}">
+                <a16:creationId xmlns:a16="http://schemas.microsoft.com/office/drawing/2014/main" id="{DAC5ACF7-BC39-419C-80A4-8146B6C15586}"/>
+              </a:ext>
+            </a:extLst>
+          </p:cNvPr>
+          <p:cNvPicPr>
+            <a:picLocks noChangeAspect="1"/>
+          </p:cNvPicPr>
+          <p:nvPr/>
+        </p:nvPicPr>
+        <p:blipFill>
+          <a:blip r:embed="rId5"/>
+          <a:stretch>
+            <a:fillRect/>
+          </a:stretch>
+        </p:blipFill>
+        <p:spPr>
+          <a:xfrm>
+            <a:off x="201336" y="3579172"/>
+            <a:ext cx="10534650" cy="904875"/>
+          </a:xfrm>
+          <a:prstGeom prst="rect">
+            <a:avLst/>
+          </a:prstGeom>
+        </p:spPr>
+      </p:pic>
+    </p:spTree>
+    <p:extLst>
+      <p:ext uri="{BB962C8B-B14F-4D97-AF65-F5344CB8AC3E}">
+        <p14:creationId xmlns:p14="http://schemas.microsoft.com/office/powerpoint/2010/main" val="1937858569"/>
       </p:ext>
     </p:extLst>
   </p:cSld>

</xml_diff>

<commit_message>
Olreans concept using Timers.
</commit_message>
<xml_diff>
--- a/Presentation/Microsoft Orleans.pptx
+++ b/Presentation/Microsoft Orleans.pptx
@@ -39,6 +39,7 @@
     <p:sldId id="289" r:id="rId36"/>
     <p:sldId id="290" r:id="rId37"/>
     <p:sldId id="291" r:id="rId38"/>
+    <p:sldId id="292" r:id="rId39"/>
   </p:sldIdLst>
   <p:sldSz cx="12192000" cy="6858000"/>
   <p:notesSz cx="6858000" cy="9144000"/>
@@ -383,7 +384,7 @@
           <a:p>
             <a:fld id="{ED291B17-9318-49DB-B28B-6E5994AE9581}" type="datetime1">
               <a:rPr lang="en-US" smtClean="0"/>
-              <a:t>2/5/2021</a:t>
+              <a:t>2/7/2021</a:t>
             </a:fld>
             <a:endParaRPr lang="en-US" dirty="0"/>
           </a:p>
@@ -586,7 +587,7 @@
           <a:p>
             <a:fld id="{2CED4963-E985-44C4-B8C4-FDD613B7C2F8}" type="datetime1">
               <a:rPr lang="en-US" smtClean="0"/>
-              <a:t>2/5/2021</a:t>
+              <a:t>2/7/2021</a:t>
             </a:fld>
             <a:endParaRPr lang="en-US" dirty="0"/>
           </a:p>
@@ -948,7 +949,7 @@
           <a:p>
             <a:fld id="{ED291B17-9318-49DB-B28B-6E5994AE9581}" type="datetime1">
               <a:rPr lang="en-US" smtClean="0"/>
-              <a:t>2/5/2021</a:t>
+              <a:t>2/7/2021</a:t>
             </a:fld>
             <a:endParaRPr lang="en-US" dirty="0"/>
           </a:p>
@@ -1146,7 +1147,7 @@
           <a:p>
             <a:fld id="{78DD82B9-B8EE-4375-B6FF-88FA6ABB15D9}" type="datetime1">
               <a:rPr lang="en-US" smtClean="0"/>
-              <a:t>2/5/2021</a:t>
+              <a:t>2/7/2021</a:t>
             </a:fld>
             <a:endParaRPr lang="en-US" dirty="0"/>
           </a:p>
@@ -1458,7 +1459,7 @@
           <a:p>
             <a:fld id="{B2497495-0637-405E-AE64-5CC7506D51F5}" type="datetime1">
               <a:rPr lang="en-US" smtClean="0"/>
-              <a:t>2/5/2021</a:t>
+              <a:t>2/7/2021</a:t>
             </a:fld>
             <a:endParaRPr lang="en-US" dirty="0"/>
           </a:p>
@@ -1711,7 +1712,7 @@
           <a:p>
             <a:fld id="{7BFFD690-9426-415D-8B65-26881E07B2D4}" type="datetime1">
               <a:rPr lang="en-US" smtClean="0"/>
-              <a:t>2/5/2021</a:t>
+              <a:t>2/7/2021</a:t>
             </a:fld>
             <a:endParaRPr lang="en-US" dirty="0"/>
           </a:p>
@@ -2133,7 +2134,7 @@
           <a:p>
             <a:fld id="{04C4989A-474C-40DE-95B9-011C28B71673}" type="datetime1">
               <a:rPr lang="en-US" smtClean="0"/>
-              <a:t>2/5/2021</a:t>
+              <a:t>2/7/2021</a:t>
             </a:fld>
             <a:endParaRPr lang="en-US" dirty="0"/>
           </a:p>
@@ -2256,7 +2257,7 @@
           <a:p>
             <a:fld id="{5DB4ED54-5B5E-4A04-93D3-5772E3CE3818}" type="datetime1">
               <a:rPr lang="en-US" smtClean="0"/>
-              <a:t>2/5/2021</a:t>
+              <a:t>2/7/2021</a:t>
             </a:fld>
             <a:endParaRPr lang="en-US" dirty="0"/>
           </a:p>
@@ -2351,7 +2352,7 @@
           <a:p>
             <a:fld id="{4EDE50D6-574B-40AF-946F-D52A04ADE379}" type="datetime1">
               <a:rPr lang="en-US" smtClean="0"/>
-              <a:t>2/5/2021</a:t>
+              <a:t>2/7/2021</a:t>
             </a:fld>
             <a:endParaRPr lang="en-US" dirty="0"/>
           </a:p>
@@ -2728,7 +2729,7 @@
           <a:p>
             <a:fld id="{D82884F1-FFEA-405F-9602-3DCA865EDA4E}" type="datetime1">
               <a:rPr lang="en-US" smtClean="0"/>
-              <a:t>2/5/2021</a:t>
+              <a:t>2/7/2021</a:t>
             </a:fld>
             <a:endParaRPr lang="en-US" dirty="0"/>
           </a:p>
@@ -3021,7 +3022,7 @@
           <a:p>
             <a:fld id="{7E18DB4A-8810-4A10-AD5C-D5E2C667F5B3}" type="datetime1">
               <a:rPr lang="en-US" smtClean="0"/>
-              <a:t>2/5/2021</a:t>
+              <a:t>2/7/2021</a:t>
             </a:fld>
             <a:endParaRPr lang="en-US" dirty="0"/>
           </a:p>
@@ -3236,7 +3237,7 @@
           <a:p>
             <a:fld id="{ED291B17-9318-49DB-B28B-6E5994AE9581}" type="datetime1">
               <a:rPr lang="en-US" smtClean="0"/>
-              <a:t>2/5/2021</a:t>
+              <a:t>2/7/2021</a:t>
             </a:fld>
             <a:endParaRPr lang="en-US" dirty="0"/>
           </a:p>
@@ -8911,13 +8912,8 @@
             </a:pPr>
             <a:r>
               <a:rPr lang="en-US" dirty="0"/>
-              <a:t>Any time, the grain is deactivated, the timer is lost. This issue being solved </a:t>
-            </a:r>
-            <a:r>
-              <a:rPr lang="en-US"/>
-              <a:t>with Reminders.</a:t>
-            </a:r>
-            <a:endParaRPr lang="en-US" dirty="0"/>
+              <a:t>Any time, the grain is deactivated, the timer is lost. This issue being solved with Reminders.</a:t>
+            </a:r>
           </a:p>
         </p:txBody>
       </p:sp>
@@ -8925,6 +8921,147 @@
     <p:extLst>
       <p:ext uri="{BB962C8B-B14F-4D97-AF65-F5344CB8AC3E}">
         <p14:creationId xmlns:p14="http://schemas.microsoft.com/office/powerpoint/2010/main" val="3311739112"/>
+      </p:ext>
+    </p:extLst>
+  </p:cSld>
+  <p:clrMapOvr>
+    <a:masterClrMapping/>
+  </p:clrMapOvr>
+</p:sld>
+</file>
+
+<file path=ppt/slides/slide35.xml><?xml version="1.0" encoding="utf-8"?>
+<p:sld xmlns:a="http://schemas.openxmlformats.org/drawingml/2006/main" xmlns:r="http://schemas.openxmlformats.org/officeDocument/2006/relationships" xmlns:p="http://schemas.openxmlformats.org/presentationml/2006/main">
+  <p:cSld>
+    <p:spTree>
+      <p:nvGrpSpPr>
+        <p:cNvPr id="1" name=""/>
+        <p:cNvGrpSpPr/>
+        <p:nvPr/>
+      </p:nvGrpSpPr>
+      <p:grpSpPr>
+        <a:xfrm>
+          <a:off x="0" y="0"/>
+          <a:ext cx="0" cy="0"/>
+          <a:chOff x="0" y="0"/>
+          <a:chExt cx="0" cy="0"/>
+        </a:xfrm>
+      </p:grpSpPr>
+      <p:sp>
+        <p:nvSpPr>
+          <p:cNvPr id="2" name="Title 1">
+            <a:extLst>
+              <a:ext uri="{FF2B5EF4-FFF2-40B4-BE49-F238E27FC236}">
+                <a16:creationId xmlns:a16="http://schemas.microsoft.com/office/drawing/2014/main" id="{BA69BA20-5296-493C-B9C3-3E6A20D90C53}"/>
+              </a:ext>
+            </a:extLst>
+          </p:cNvPr>
+          <p:cNvSpPr>
+            <a:spLocks noGrp="1"/>
+          </p:cNvSpPr>
+          <p:nvPr>
+            <p:ph type="title"/>
+          </p:nvPr>
+        </p:nvSpPr>
+        <p:spPr>
+          <a:xfrm>
+            <a:off x="581192" y="702156"/>
+            <a:ext cx="11029616" cy="489081"/>
+          </a:xfrm>
+        </p:spPr>
+        <p:txBody>
+          <a:bodyPr>
+            <a:normAutofit fontScale="90000"/>
+          </a:bodyPr>
+          <a:lstStyle/>
+          <a:p>
+            <a:r>
+              <a:rPr lang="en-US" dirty="0"/>
+              <a:t>GRAIN SERVICE</a:t>
+            </a:r>
+          </a:p>
+        </p:txBody>
+      </p:sp>
+      <p:sp>
+        <p:nvSpPr>
+          <p:cNvPr id="4" name="TextBox 3">
+            <a:extLst>
+              <a:ext uri="{FF2B5EF4-FFF2-40B4-BE49-F238E27FC236}">
+                <a16:creationId xmlns:a16="http://schemas.microsoft.com/office/drawing/2014/main" id="{135A1742-C0FB-4DB5-99CC-D3CE3AACB769}"/>
+              </a:ext>
+            </a:extLst>
+          </p:cNvPr>
+          <p:cNvSpPr txBox="1"/>
+          <p:nvPr/>
+        </p:nvSpPr>
+        <p:spPr>
+          <a:xfrm>
+            <a:off x="352337" y="1264218"/>
+            <a:ext cx="11078226" cy="1477328"/>
+          </a:xfrm>
+          <a:prstGeom prst="rect">
+            <a:avLst/>
+          </a:prstGeom>
+          <a:noFill/>
+        </p:spPr>
+        <p:txBody>
+          <a:bodyPr wrap="none" rtlCol="0">
+            <a:spAutoFit/>
+          </a:bodyPr>
+          <a:lstStyle/>
+          <a:p>
+            <a:pPr marL="285750" indent="-285750">
+              <a:buFont typeface="Arial" panose="020B0604020202020204" pitchFamily="34" charset="0"/>
+              <a:buChar char="•"/>
+            </a:pPr>
+            <a:r>
+              <a:rPr lang="en-US" dirty="0"/>
+              <a:t>Grain service is a special grain without identity. It is running in every silo from Startup to Shutdown. </a:t>
+            </a:r>
+          </a:p>
+          <a:p>
+            <a:pPr marL="285750" indent="-285750">
+              <a:buFont typeface="Arial" panose="020B0604020202020204" pitchFamily="34" charset="0"/>
+              <a:buChar char="•"/>
+            </a:pPr>
+            <a:r>
+              <a:rPr lang="en-US" dirty="0"/>
+              <a:t>Grain service are single threaded like normal grains except concept of </a:t>
+            </a:r>
+            <a:r>
+              <a:rPr lang="en-US"/>
+              <a:t>reentrance.</a:t>
+            </a:r>
+          </a:p>
+          <a:p>
+            <a:pPr marL="285750" indent="-285750">
+              <a:buFont typeface="Arial" panose="020B0604020202020204" pitchFamily="34" charset="0"/>
+              <a:buChar char="•"/>
+            </a:pPr>
+            <a:endParaRPr lang="en-US" dirty="0"/>
+          </a:p>
+          <a:p>
+            <a:r>
+              <a:rPr lang="en-US" dirty="0"/>
+              <a:t>Cons:</a:t>
+            </a:r>
+          </a:p>
+          <a:p>
+            <a:pPr marL="285750" indent="-285750">
+              <a:buFont typeface="Arial" panose="020B0604020202020204" pitchFamily="34" charset="0"/>
+              <a:buChar char="•"/>
+            </a:pPr>
+            <a:r>
+              <a:rPr lang="en-US" dirty="0"/>
+              <a:t>One grain service cannot handle more than one request at the same time before previous request is finished.</a:t>
+            </a:r>
+          </a:p>
+        </p:txBody>
+      </p:sp>
+    </p:spTree>
+    <p:extLst>
+      <p:ext uri="{BB962C8B-B14F-4D97-AF65-F5344CB8AC3E}">
+        <p14:creationId xmlns:p14="http://schemas.microsoft.com/office/powerpoint/2010/main" val="3163295205"/>
       </p:ext>
     </p:extLst>
   </p:cSld>
@@ -10230,21 +10367,21 @@
 </file>
 
 <file path=customXml/item1.xml><?xml version="1.0" encoding="utf-8"?>
+<p:properties xmlns:p="http://schemas.microsoft.com/office/2006/metadata/properties" xmlns:xsi="http://www.w3.org/2001/XMLSchema-instance" xmlns:pc="http://schemas.microsoft.com/office/infopath/2007/PartnerControls">
+  <documentManagement>
+    <Status xmlns="71af3243-3dd4-4a8d-8c0d-dd76da1f02a5">Not started</Status>
+    <MediaServiceKeyPoints xmlns="71af3243-3dd4-4a8d-8c0d-dd76da1f02a5" xsi:nil="true"/>
+  </documentManagement>
+</p:properties>
+</file>
+
+<file path=customXml/item2.xml><?xml version="1.0" encoding="utf-8"?>
 <?mso-contentType ?>
 <FormTemplates xmlns="http://schemas.microsoft.com/sharepoint/v3/contenttype/forms">
   <Display>DocumentLibraryForm</Display>
   <Edit>DocumentLibraryForm</Edit>
   <New>DocumentLibraryForm</New>
 </FormTemplates>
-</file>
-
-<file path=customXml/item2.xml><?xml version="1.0" encoding="utf-8"?>
-<p:properties xmlns:p="http://schemas.microsoft.com/office/2006/metadata/properties" xmlns:xsi="http://www.w3.org/2001/XMLSchema-instance" xmlns:pc="http://schemas.microsoft.com/office/infopath/2007/PartnerControls">
-  <documentManagement>
-    <Status xmlns="71af3243-3dd4-4a8d-8c0d-dd76da1f02a5">Not started</Status>
-    <MediaServiceKeyPoints xmlns="71af3243-3dd4-4a8d-8c0d-dd76da1f02a5" xsi:nil="true"/>
-  </documentManagement>
-</p:properties>
 </file>
 
 <file path=customXml/item3.xml><?xml version="1.0" encoding="utf-8"?>
@@ -10469,19 +10606,19 @@
 </file>
 
 <file path=customXml/itemProps1.xml><?xml version="1.0" encoding="utf-8"?>
-<ds:datastoreItem xmlns:ds="http://schemas.openxmlformats.org/officeDocument/2006/customXml" ds:itemID="{927BD4C1-B6B1-4715-ABF9-E660A51A4EA0}">
+<ds:datastoreItem xmlns:ds="http://schemas.openxmlformats.org/officeDocument/2006/customXml" ds:itemID="{8D289AE2-D2AE-49D1-AFAC-3A79F6794255}">
   <ds:schemaRefs>
-    <ds:schemaRef ds:uri="http://schemas.microsoft.com/sharepoint/v3/contenttype/forms"/>
+    <ds:schemaRef ds:uri="http://schemas.microsoft.com/office/2006/metadata/properties"/>
+    <ds:schemaRef ds:uri="http://schemas.microsoft.com/office/infopath/2007/PartnerControls"/>
+    <ds:schemaRef ds:uri="71af3243-3dd4-4a8d-8c0d-dd76da1f02a5"/>
   </ds:schemaRefs>
 </ds:datastoreItem>
 </file>
 
 <file path=customXml/itemProps2.xml><?xml version="1.0" encoding="utf-8"?>
-<ds:datastoreItem xmlns:ds="http://schemas.openxmlformats.org/officeDocument/2006/customXml" ds:itemID="{8D289AE2-D2AE-49D1-AFAC-3A79F6794255}">
+<ds:datastoreItem xmlns:ds="http://schemas.openxmlformats.org/officeDocument/2006/customXml" ds:itemID="{927BD4C1-B6B1-4715-ABF9-E660A51A4EA0}">
   <ds:schemaRefs>
-    <ds:schemaRef ds:uri="http://schemas.microsoft.com/office/2006/metadata/properties"/>
-    <ds:schemaRef ds:uri="http://schemas.microsoft.com/office/infopath/2007/PartnerControls"/>
-    <ds:schemaRef ds:uri="71af3243-3dd4-4a8d-8c0d-dd76da1f02a5"/>
+    <ds:schemaRef ds:uri="http://schemas.microsoft.com/sharepoint/v3/contenttype/forms"/>
   </ds:schemaRefs>
 </ds:datastoreItem>
 </file>

</xml_diff>